<commit_message>
Make separate directory for PDF slides
</commit_message>
<xml_diff>
--- a/RR_knitr.pptx
+++ b/RR_knitr.pptx
@@ -15,47 +15,48 @@
     <p:sldId id="264" r:id="rId9"/>
     <p:sldId id="265" r:id="rId10"/>
     <p:sldId id="266" r:id="rId11"/>
-    <p:sldId id="267" r:id="rId12"/>
-    <p:sldId id="268" r:id="rId13"/>
-    <p:sldId id="269" r:id="rId14"/>
-    <p:sldId id="270" r:id="rId15"/>
-    <p:sldId id="271" r:id="rId16"/>
-    <p:sldId id="272" r:id="rId17"/>
-    <p:sldId id="273" r:id="rId18"/>
-    <p:sldId id="274" r:id="rId19"/>
-    <p:sldId id="282" r:id="rId20"/>
-    <p:sldId id="283" r:id="rId21"/>
-    <p:sldId id="275" r:id="rId22"/>
-    <p:sldId id="278" r:id="rId23"/>
-    <p:sldId id="279" r:id="rId24"/>
-    <p:sldId id="276" r:id="rId25"/>
-    <p:sldId id="277" r:id="rId26"/>
-    <p:sldId id="280" r:id="rId27"/>
-    <p:sldId id="281" r:id="rId28"/>
-    <p:sldId id="284" r:id="rId29"/>
-    <p:sldId id="286" r:id="rId30"/>
-    <p:sldId id="285" r:id="rId31"/>
-    <p:sldId id="287" r:id="rId32"/>
-    <p:sldId id="288" r:id="rId33"/>
-    <p:sldId id="291" r:id="rId34"/>
-    <p:sldId id="292" r:id="rId35"/>
-    <p:sldId id="290" r:id="rId36"/>
-    <p:sldId id="293" r:id="rId37"/>
-    <p:sldId id="294" r:id="rId38"/>
-    <p:sldId id="295" r:id="rId39"/>
-    <p:sldId id="296" r:id="rId40"/>
-    <p:sldId id="297" r:id="rId41"/>
-    <p:sldId id="298" r:id="rId42"/>
-    <p:sldId id="299" r:id="rId43"/>
-    <p:sldId id="300" r:id="rId44"/>
-    <p:sldId id="301" r:id="rId45"/>
-    <p:sldId id="302" r:id="rId46"/>
-    <p:sldId id="306" r:id="rId47"/>
-    <p:sldId id="305" r:id="rId48"/>
-    <p:sldId id="307" r:id="rId49"/>
-    <p:sldId id="303" r:id="rId50"/>
-    <p:sldId id="289" r:id="rId51"/>
-    <p:sldId id="308" r:id="rId52"/>
+    <p:sldId id="309" r:id="rId12"/>
+    <p:sldId id="267" r:id="rId13"/>
+    <p:sldId id="268" r:id="rId14"/>
+    <p:sldId id="269" r:id="rId15"/>
+    <p:sldId id="270" r:id="rId16"/>
+    <p:sldId id="271" r:id="rId17"/>
+    <p:sldId id="272" r:id="rId18"/>
+    <p:sldId id="273" r:id="rId19"/>
+    <p:sldId id="274" r:id="rId20"/>
+    <p:sldId id="282" r:id="rId21"/>
+    <p:sldId id="283" r:id="rId22"/>
+    <p:sldId id="275" r:id="rId23"/>
+    <p:sldId id="278" r:id="rId24"/>
+    <p:sldId id="279" r:id="rId25"/>
+    <p:sldId id="276" r:id="rId26"/>
+    <p:sldId id="277" r:id="rId27"/>
+    <p:sldId id="280" r:id="rId28"/>
+    <p:sldId id="281" r:id="rId29"/>
+    <p:sldId id="284" r:id="rId30"/>
+    <p:sldId id="286" r:id="rId31"/>
+    <p:sldId id="285" r:id="rId32"/>
+    <p:sldId id="287" r:id="rId33"/>
+    <p:sldId id="288" r:id="rId34"/>
+    <p:sldId id="291" r:id="rId35"/>
+    <p:sldId id="292" r:id="rId36"/>
+    <p:sldId id="290" r:id="rId37"/>
+    <p:sldId id="293" r:id="rId38"/>
+    <p:sldId id="294" r:id="rId39"/>
+    <p:sldId id="295" r:id="rId40"/>
+    <p:sldId id="296" r:id="rId41"/>
+    <p:sldId id="297" r:id="rId42"/>
+    <p:sldId id="298" r:id="rId43"/>
+    <p:sldId id="299" r:id="rId44"/>
+    <p:sldId id="300" r:id="rId45"/>
+    <p:sldId id="301" r:id="rId46"/>
+    <p:sldId id="302" r:id="rId47"/>
+    <p:sldId id="306" r:id="rId48"/>
+    <p:sldId id="305" r:id="rId49"/>
+    <p:sldId id="307" r:id="rId50"/>
+    <p:sldId id="303" r:id="rId51"/>
+    <p:sldId id="289" r:id="rId52"/>
+    <p:sldId id="308" r:id="rId53"/>
   </p:sldIdLst>
   <p:sldSz cx="9144000" cy="6858000" type="screen4x3"/>
   <p:notesSz cx="6858000" cy="9144000"/>
@@ -3163,13 +3164,17 @@
         </p:spPr>
         <p:txBody>
           <a:bodyPr>
-            <a:normAutofit/>
+            <a:normAutofit fontScale="90000"/>
           </a:bodyPr>
           <a:lstStyle/>
           <a:p>
             <a:r>
               <a:rPr lang="en-US" dirty="0" smtClean="0"/>
-              <a:t>Literate Statistical Programming (with </a:t>
+              <a:t>Reproducible Research and Literate </a:t>
+            </a:r>
+            <a:r>
+              <a:rPr lang="en-US" dirty="0" smtClean="0"/>
+              <a:t>Statistical Programming (with </a:t>
             </a:r>
             <a:r>
               <a:rPr lang="en-US" dirty="0" err="1" smtClean="0"/>
@@ -3404,78 +3409,53 @@
           <a:lstStyle/>
           <a:p>
             <a:r>
-              <a:rPr lang="en-US" dirty="0" smtClean="0"/>
+              <a:rPr lang="en-US" dirty="0"/>
               <a:t>Recent Developments in</a:t>
             </a:r>
             <a:br>
-              <a:rPr lang="en-US" dirty="0" smtClean="0"/>
+              <a:rPr lang="en-US" dirty="0"/>
             </a:br>
             <a:r>
-              <a:rPr lang="en-US" dirty="0" smtClean="0"/>
+              <a:rPr lang="en-US" dirty="0"/>
               <a:t>Reproducible Research</a:t>
             </a:r>
-            <a:endParaRPr lang="en-US" dirty="0"/>
           </a:p>
         </p:txBody>
       </p:sp>
       <p:pic>
         <p:nvPicPr>
-          <p:cNvPr id="3" name="Picture 2" descr="Screen Shot 2012-04-01 at 1.17.32 PM.png"/>
+          <p:cNvPr id="4" name="Picture 3" descr="Screen Shot 2013-04-25 at 8.36.47 PM.png"/>
           <p:cNvPicPr>
             <a:picLocks noChangeAspect="1"/>
           </p:cNvPicPr>
           <p:nvPr/>
         </p:nvPicPr>
         <p:blipFill>
-          <a:blip r:embed="rId2"/>
+          <a:blip r:embed="rId2">
+            <a:extLst>
+              <a:ext uri="{28A0092B-C50C-407E-A947-70E740481C1C}">
+                <a14:useLocalDpi xmlns:a14="http://schemas.microsoft.com/office/drawing/2010/main" val="0"/>
+              </a:ext>
+            </a:extLst>
+          </a:blip>
           <a:stretch>
             <a:fillRect/>
           </a:stretch>
         </p:blipFill>
         <p:spPr>
           <a:xfrm>
-            <a:off x="1887720" y="1569808"/>
-            <a:ext cx="5487296" cy="5288192"/>
+            <a:off x="417536" y="1833282"/>
+            <a:ext cx="8282919" cy="4730758"/>
           </a:xfrm>
           <a:prstGeom prst="rect">
             <a:avLst/>
           </a:prstGeom>
         </p:spPr>
       </p:pic>
-      <p:sp>
-        <p:nvSpPr>
-          <p:cNvPr id="4" name="TextBox 3"/>
-          <p:cNvSpPr txBox="1"/>
-          <p:nvPr/>
-        </p:nvSpPr>
-        <p:spPr>
-          <a:xfrm>
-            <a:off x="148729" y="1979452"/>
-            <a:ext cx="1738991" cy="1077218"/>
-          </a:xfrm>
-          <a:prstGeom prst="rect">
-            <a:avLst/>
-          </a:prstGeom>
-          <a:noFill/>
-        </p:spPr>
-        <p:txBody>
-          <a:bodyPr wrap="square" rtlCol="0">
-            <a:spAutoFit/>
-          </a:bodyPr>
-          <a:lstStyle/>
-          <a:p>
-            <a:r>
-              <a:rPr lang="en-US" sz="3200" dirty="0" smtClean="0"/>
-              <a:t>The Duke Saga</a:t>
-            </a:r>
-            <a:endParaRPr lang="en-US" sz="3200" dirty="0"/>
-          </a:p>
-        </p:txBody>
-      </p:sp>
     </p:spTree>
     <p:extLst>
       <p:ext uri="{BB962C8B-B14F-4D97-AF65-F5344CB8AC3E}">
-        <p14:creationId xmlns:p14="http://schemas.microsoft.com/office/powerpoint/2010/main" val="2069371717"/>
+        <p14:creationId xmlns:p14="http://schemas.microsoft.com/office/powerpoint/2010/main" val="1026461849"/>
       </p:ext>
     </p:extLst>
   </p:cSld>
@@ -3536,7 +3516,7 @@
       </p:sp>
       <p:pic>
         <p:nvPicPr>
-          <p:cNvPr id="4" name="Picture 3" descr="Screen Shot 2012-03-27 at 9.49.29 AM.png"/>
+          <p:cNvPr id="3" name="Picture 2" descr="Screen Shot 2012-04-01 at 1.17.32 PM.png"/>
           <p:cNvPicPr>
             <a:picLocks noChangeAspect="1"/>
           </p:cNvPicPr>
@@ -3550,18 +3530,90 @@
         </p:blipFill>
         <p:spPr>
           <a:xfrm>
-            <a:off x="0" y="1497732"/>
-            <a:ext cx="9144000" cy="5350776"/>
+            <a:off x="2406626" y="1569808"/>
+            <a:ext cx="5487296" cy="5288192"/>
           </a:xfrm>
           <a:prstGeom prst="rect">
             <a:avLst/>
           </a:prstGeom>
         </p:spPr>
       </p:pic>
+      <p:sp>
+        <p:nvSpPr>
+          <p:cNvPr id="4" name="TextBox 3"/>
+          <p:cNvSpPr txBox="1"/>
+          <p:nvPr/>
+        </p:nvSpPr>
+        <p:spPr>
+          <a:xfrm>
+            <a:off x="148729" y="1979452"/>
+            <a:ext cx="1738991" cy="1077218"/>
+          </a:xfrm>
+          <a:prstGeom prst="rect">
+            <a:avLst/>
+          </a:prstGeom>
+          <a:noFill/>
+        </p:spPr>
+        <p:txBody>
+          <a:bodyPr wrap="square" rtlCol="0">
+            <a:spAutoFit/>
+          </a:bodyPr>
+          <a:lstStyle/>
+          <a:p>
+            <a:r>
+              <a:rPr lang="en-US" sz="3200" dirty="0" smtClean="0"/>
+              <a:t>The Duke Saga</a:t>
+            </a:r>
+            <a:endParaRPr lang="en-US" sz="3200" dirty="0"/>
+          </a:p>
+        </p:txBody>
+      </p:sp>
+      <p:sp>
+        <p:nvSpPr>
+          <p:cNvPr id="5" name="TextBox 4"/>
+          <p:cNvSpPr txBox="1"/>
+          <p:nvPr/>
+        </p:nvSpPr>
+        <p:spPr>
+          <a:xfrm>
+            <a:off x="148729" y="3372675"/>
+            <a:ext cx="1963924" cy="369332"/>
+          </a:xfrm>
+          <a:prstGeom prst="rect">
+            <a:avLst/>
+          </a:prstGeom>
+          <a:noFill/>
+        </p:spPr>
+        <p:txBody>
+          <a:bodyPr wrap="none" rtlCol="0">
+            <a:spAutoFit/>
+          </a:bodyPr>
+          <a:lstStyle/>
+          <a:p>
+            <a:r>
+              <a:rPr lang="en-US" dirty="0"/>
+              <a:t>http://</a:t>
+            </a:r>
+            <a:r>
+              <a:rPr lang="en-US" dirty="0" err="1"/>
+              <a:t>goo.gl</a:t>
+            </a:r>
+            <a:r>
+              <a:rPr lang="en-US" dirty="0"/>
+              <a:t>/</a:t>
+            </a:r>
+            <a:r>
+              <a:rPr lang="en-US" dirty="0" err="1"/>
+              <a:t>hijaN</a:t>
+            </a:r>
+            <a:endParaRPr lang="en-US" dirty="0"/>
+          </a:p>
+        </p:txBody>
+      </p:sp>
     </p:spTree>
     <p:extLst>
       <p:ext uri="{BB962C8B-B14F-4D97-AF65-F5344CB8AC3E}">
-        <p14:creationId xmlns:p14="http://schemas.microsoft.com/office/powerpoint/2010/main" val="1790483157"/>
+        <p14:creationId xmlns:p14="http://schemas.microsoft.com/office/powerpoint/2010/main" val="2069371717"/>
       </p:ext>
     </p:extLst>
   </p:cSld>
@@ -3600,105 +3652,88 @@
         </p:nvSpPr>
         <p:spPr/>
         <p:txBody>
-          <a:bodyPr/>
-          <a:lstStyle/>
-          <a:p>
-            <a:r>
-              <a:rPr lang="en-US" dirty="0" smtClean="0"/>
-              <a:t>The IOM Report</a:t>
+          <a:bodyPr>
+            <a:normAutofit fontScale="90000"/>
+          </a:bodyPr>
+          <a:lstStyle/>
+          <a:p>
+            <a:r>
+              <a:rPr lang="en-US" dirty="0" smtClean="0"/>
+              <a:t>Recent Developments in</a:t>
+            </a:r>
+            <a:br>
+              <a:rPr lang="en-US" dirty="0" smtClean="0"/>
+            </a:br>
+            <a:r>
+              <a:rPr lang="en-US" dirty="0" smtClean="0"/>
+              <a:t>Reproducible Research</a:t>
             </a:r>
             <a:endParaRPr lang="en-US" dirty="0"/>
           </a:p>
         </p:txBody>
       </p:sp>
-      <p:sp>
-        <p:nvSpPr>
-          <p:cNvPr id="3" name="Content Placeholder 2"/>
-          <p:cNvSpPr>
-            <a:spLocks noGrp="1"/>
-          </p:cNvSpPr>
-          <p:nvPr>
-            <p:ph idx="1"/>
-          </p:nvPr>
-        </p:nvSpPr>
+      <p:pic>
+        <p:nvPicPr>
+          <p:cNvPr id="4" name="Picture 3" descr="Screen Shot 2012-03-27 at 9.49.29 AM.png"/>
+          <p:cNvPicPr>
+            <a:picLocks noChangeAspect="1"/>
+          </p:cNvPicPr>
+          <p:nvPr/>
+        </p:nvPicPr>
+        <p:blipFill>
+          <a:blip r:embed="rId2"/>
+          <a:stretch>
+            <a:fillRect/>
+          </a:stretch>
+        </p:blipFill>
         <p:spPr>
           <a:xfrm>
-            <a:off x="457200" y="1600200"/>
-            <a:ext cx="8229600" cy="4965647"/>
-          </a:xfrm>
-        </p:spPr>
-        <p:txBody>
-          <a:bodyPr>
-            <a:normAutofit fontScale="85000" lnSpcReduction="10000"/>
+            <a:off x="0" y="1497732"/>
+            <a:ext cx="9144000" cy="5350776"/>
+          </a:xfrm>
+          <a:prstGeom prst="rect">
+            <a:avLst/>
+          </a:prstGeom>
+        </p:spPr>
+      </p:pic>
+      <p:sp>
+        <p:nvSpPr>
+          <p:cNvPr id="3" name="TextBox 2"/>
+          <p:cNvSpPr txBox="1"/>
+          <p:nvPr/>
+        </p:nvSpPr>
+        <p:spPr>
+          <a:xfrm>
+            <a:off x="259453" y="6267441"/>
+            <a:ext cx="1873079" cy="369332"/>
+          </a:xfrm>
+          <a:prstGeom prst="rect">
+            <a:avLst/>
+          </a:prstGeom>
+          <a:noFill/>
+        </p:spPr>
+        <p:txBody>
+          <a:bodyPr wrap="none" rtlCol="0">
+            <a:spAutoFit/>
           </a:bodyPr>
           <a:lstStyle/>
           <a:p>
-            <a:pPr>
-              <a:buNone/>
-            </a:pPr>
-            <a:r>
-              <a:rPr lang="en-US" dirty="0" smtClean="0"/>
-              <a:t>In the Discovery/Test Validation stage of </a:t>
-            </a:r>
-            <a:r>
-              <a:rPr lang="en-US" dirty="0" err="1" smtClean="0"/>
-              <a:t>omics</a:t>
-            </a:r>
-            <a:r>
-              <a:rPr lang="en-US" dirty="0" smtClean="0"/>
-              <a:t>-based tests:</a:t>
-            </a:r>
-          </a:p>
-          <a:p>
-            <a:r>
-              <a:rPr lang="en-US" b="1" dirty="0" smtClean="0"/>
-              <a:t>Data/metadata </a:t>
-            </a:r>
-            <a:r>
-              <a:rPr lang="en-US" dirty="0" smtClean="0"/>
-              <a:t>used to develop test should be made publicly available</a:t>
-            </a:r>
-          </a:p>
-          <a:p>
-            <a:r>
-              <a:rPr lang="en-US" dirty="0" smtClean="0"/>
-              <a:t>The </a:t>
-            </a:r>
-            <a:r>
-              <a:rPr lang="en-US" b="1" dirty="0" smtClean="0"/>
-              <a:t>computer code </a:t>
-            </a:r>
-            <a:r>
-              <a:rPr lang="en-US" dirty="0" smtClean="0"/>
-              <a:t>and fully specified computational procedures used for development of the candidate </a:t>
-            </a:r>
-            <a:r>
-              <a:rPr lang="en-US" dirty="0" err="1" smtClean="0"/>
-              <a:t>omics</a:t>
-            </a:r>
-            <a:r>
-              <a:rPr lang="en-US" dirty="0" smtClean="0"/>
-              <a:t>-based test should be made sustainably available</a:t>
-            </a:r>
-          </a:p>
-          <a:p>
-            <a:r>
-              <a:rPr lang="en-US" dirty="0" smtClean="0"/>
-              <a:t>“Ideally, the computer code that is released will </a:t>
-            </a:r>
-            <a:r>
-              <a:rPr lang="en-US" b="1" dirty="0" smtClean="0"/>
-              <a:t>encompass all of the steps of computational analysis</a:t>
-            </a:r>
-            <a:r>
-              <a:rPr lang="en-US" dirty="0" smtClean="0"/>
-              <a:t>, including all data preprocessing steps, that have been described in this chapter. All aspects of the analysis need to be transparently reported.”</a:t>
-            </a:r>
-          </a:p>
-          <a:p>
-            <a:pPr>
-              <a:buNone/>
-            </a:pPr>
+            <a:r>
+              <a:rPr lang="en-US" dirty="0"/>
+              <a:t>http://</a:t>
+            </a:r>
+            <a:r>
+              <a:rPr lang="en-US" dirty="0" err="1"/>
+              <a:t>goo.gl</a:t>
+            </a:r>
+            <a:r>
+              <a:rPr lang="en-US" dirty="0"/>
+              <a:t>/</a:t>
+            </a:r>
+            <a:r>
+              <a:rPr lang="en-US" dirty="0" err="1"/>
+              <a:t>ZllJa</a:t>
+            </a:r>
             <a:endParaRPr lang="en-US" dirty="0"/>
           </a:p>
         </p:txBody>
@@ -3706,7 +3741,7 @@
     </p:spTree>
     <p:extLst>
       <p:ext uri="{BB962C8B-B14F-4D97-AF65-F5344CB8AC3E}">
-        <p14:creationId xmlns:p14="http://schemas.microsoft.com/office/powerpoint/2010/main" val="257063506"/>
+        <p14:creationId xmlns:p14="http://schemas.microsoft.com/office/powerpoint/2010/main" val="1790483157"/>
       </p:ext>
     </p:extLst>
   </p:cSld>
@@ -3745,96 +3780,113 @@
         </p:nvSpPr>
         <p:spPr/>
         <p:txBody>
+          <a:bodyPr/>
+          <a:lstStyle/>
+          <a:p>
+            <a:r>
+              <a:rPr lang="en-US" dirty="0" smtClean="0"/>
+              <a:t>The IOM Report</a:t>
+            </a:r>
+            <a:endParaRPr lang="en-US" dirty="0"/>
+          </a:p>
+        </p:txBody>
+      </p:sp>
+      <p:sp>
+        <p:nvSpPr>
+          <p:cNvPr id="3" name="Content Placeholder 2"/>
+          <p:cNvSpPr>
+            <a:spLocks noGrp="1"/>
+          </p:cNvSpPr>
+          <p:nvPr>
+            <p:ph idx="1"/>
+          </p:nvPr>
+        </p:nvSpPr>
+        <p:spPr>
+          <a:xfrm>
+            <a:off x="457200" y="1600200"/>
+            <a:ext cx="8229600" cy="4965647"/>
+          </a:xfrm>
+        </p:spPr>
+        <p:txBody>
           <a:bodyPr>
-            <a:normAutofit fontScale="90000"/>
+            <a:normAutofit fontScale="85000" lnSpcReduction="10000"/>
           </a:bodyPr>
           <a:lstStyle/>
           <a:p>
-            <a:r>
-              <a:rPr lang="en-US" dirty="0" smtClean="0"/>
-              <a:t>What Do We Need for</a:t>
-            </a:r>
-            <a:br>
-              <a:rPr lang="en-US" dirty="0" smtClean="0"/>
-            </a:br>
-            <a:r>
-              <a:rPr lang="en-US" dirty="0" smtClean="0"/>
-              <a:t>Reproducible Research?</a:t>
-            </a:r>
+            <a:pPr>
+              <a:buNone/>
+            </a:pPr>
+            <a:r>
+              <a:rPr lang="en-US" dirty="0" smtClean="0"/>
+              <a:t>In the Discovery/Test Validation stage of </a:t>
+            </a:r>
+            <a:r>
+              <a:rPr lang="en-US" dirty="0" err="1" smtClean="0"/>
+              <a:t>omics</a:t>
+            </a:r>
+            <a:r>
+              <a:rPr lang="en-US" dirty="0" smtClean="0"/>
+              <a:t>-based tests:</a:t>
+            </a:r>
+          </a:p>
+          <a:p>
+            <a:r>
+              <a:rPr lang="en-US" b="1" dirty="0" smtClean="0"/>
+              <a:t>Data/metadata </a:t>
+            </a:r>
+            <a:r>
+              <a:rPr lang="en-US" dirty="0" smtClean="0"/>
+              <a:t>used to develop test should be made publicly available</a:t>
+            </a:r>
+          </a:p>
+          <a:p>
+            <a:r>
+              <a:rPr lang="en-US" dirty="0" smtClean="0"/>
+              <a:t>The </a:t>
+            </a:r>
+            <a:r>
+              <a:rPr lang="en-US" b="1" dirty="0" smtClean="0"/>
+              <a:t>computer code </a:t>
+            </a:r>
+            <a:r>
+              <a:rPr lang="en-US" dirty="0" smtClean="0"/>
+              <a:t>and fully specified computational procedures used for development of the candidate </a:t>
+            </a:r>
+            <a:r>
+              <a:rPr lang="en-US" dirty="0" err="1" smtClean="0"/>
+              <a:t>omics</a:t>
+            </a:r>
+            <a:r>
+              <a:rPr lang="en-US" dirty="0" smtClean="0"/>
+              <a:t>-based test should be made sustainably available</a:t>
+            </a:r>
+          </a:p>
+          <a:p>
+            <a:r>
+              <a:rPr lang="en-US" dirty="0" smtClean="0"/>
+              <a:t>“Ideally, the computer code that is released will </a:t>
+            </a:r>
+            <a:r>
+              <a:rPr lang="en-US" b="1" dirty="0" smtClean="0"/>
+              <a:t>encompass all of the steps of computational analysis</a:t>
+            </a:r>
+            <a:r>
+              <a:rPr lang="en-US" dirty="0" smtClean="0"/>
+              <a:t>, including all data preprocessing steps, that have been described in this chapter. All aspects of the analysis need to be transparently reported.”</a:t>
+            </a:r>
+          </a:p>
+          <a:p>
+            <a:pPr>
+              <a:buNone/>
+            </a:pPr>
             <a:endParaRPr lang="en-US" dirty="0"/>
-          </a:p>
-        </p:txBody>
-      </p:sp>
-      <p:sp>
-        <p:nvSpPr>
-          <p:cNvPr id="3" name="Content Placeholder 2"/>
-          <p:cNvSpPr>
-            <a:spLocks noGrp="1"/>
-          </p:cNvSpPr>
-          <p:nvPr>
-            <p:ph idx="1"/>
-          </p:nvPr>
-        </p:nvSpPr>
-        <p:spPr/>
-        <p:txBody>
-          <a:bodyPr/>
-          <a:lstStyle/>
-          <a:p>
-            <a:r>
-              <a:rPr lang="en-US" dirty="0"/>
-              <a:t>Analytic data are </a:t>
-            </a:r>
-            <a:r>
-              <a:rPr lang="en-US" dirty="0" smtClean="0"/>
-              <a:t>available</a:t>
-            </a:r>
-          </a:p>
-          <a:p>
-            <a:r>
-              <a:rPr lang="en-US" dirty="0" smtClean="0"/>
-              <a:t>Analytic </a:t>
-            </a:r>
-            <a:r>
-              <a:rPr lang="en-US" dirty="0"/>
-              <a:t>code are </a:t>
-            </a:r>
-            <a:r>
-              <a:rPr lang="en-US" dirty="0" smtClean="0"/>
-              <a:t>available</a:t>
-            </a:r>
-            <a:endParaRPr lang="en-US" dirty="0"/>
-          </a:p>
-          <a:p>
-            <a:r>
-              <a:rPr lang="en-US" dirty="0" smtClean="0"/>
-              <a:t>Documentation </a:t>
-            </a:r>
-            <a:r>
-              <a:rPr lang="en-US" dirty="0"/>
-              <a:t>of code and </a:t>
-            </a:r>
-            <a:r>
-              <a:rPr lang="en-US" dirty="0" smtClean="0"/>
-              <a:t>data</a:t>
-            </a:r>
-            <a:endParaRPr lang="en-US" dirty="0"/>
-          </a:p>
-          <a:p>
-            <a:r>
-              <a:rPr lang="en-US" dirty="0" smtClean="0"/>
-              <a:t>Standard </a:t>
-            </a:r>
-            <a:r>
-              <a:rPr lang="en-US" dirty="0"/>
-              <a:t>means of distribution</a:t>
-            </a:r>
           </a:p>
         </p:txBody>
       </p:sp>
     </p:spTree>
     <p:extLst>
       <p:ext uri="{BB962C8B-B14F-4D97-AF65-F5344CB8AC3E}">
-        <p14:creationId xmlns:p14="http://schemas.microsoft.com/office/powerpoint/2010/main" val="3447327430"/>
+        <p14:creationId xmlns:p14="http://schemas.microsoft.com/office/powerpoint/2010/main" val="257063506"/>
       </p:ext>
     </p:extLst>
   </p:cSld>
@@ -3873,171 +3925,95 @@
         </p:nvSpPr>
         <p:spPr/>
         <p:txBody>
+          <a:bodyPr>
+            <a:normAutofit fontScale="90000"/>
+          </a:bodyPr>
+          <a:lstStyle/>
+          <a:p>
+            <a:r>
+              <a:rPr lang="en-US" dirty="0" smtClean="0"/>
+              <a:t>When Can Research be Reproducible?</a:t>
+            </a:r>
+            <a:endParaRPr lang="en-US" dirty="0"/>
+          </a:p>
+        </p:txBody>
+      </p:sp>
+      <p:sp>
+        <p:nvSpPr>
+          <p:cNvPr id="3" name="Content Placeholder 2"/>
+          <p:cNvSpPr>
+            <a:spLocks noGrp="1"/>
+          </p:cNvSpPr>
+          <p:nvPr>
+            <p:ph idx="1"/>
+          </p:nvPr>
+        </p:nvSpPr>
+        <p:spPr/>
+        <p:txBody>
           <a:bodyPr/>
           <a:lstStyle/>
           <a:p>
             <a:r>
-              <a:rPr lang="en-US" dirty="0" smtClean="0"/>
-              <a:t>Literate (Statistical) Programming</a:t>
+              <a:rPr lang="en-US" dirty="0"/>
+              <a:t>Analytic data are </a:t>
+            </a:r>
+            <a:r>
+              <a:rPr lang="en-US" dirty="0" smtClean="0"/>
+              <a:t>available</a:t>
+            </a:r>
+          </a:p>
+          <a:p>
+            <a:r>
+              <a:rPr lang="en-US" dirty="0" smtClean="0"/>
+              <a:t>Analytic </a:t>
+            </a:r>
+            <a:r>
+              <a:rPr lang="en-US" dirty="0"/>
+              <a:t>code are </a:t>
+            </a:r>
+            <a:r>
+              <a:rPr lang="en-US" dirty="0" smtClean="0"/>
+              <a:t>available</a:t>
             </a:r>
             <a:endParaRPr lang="en-US" dirty="0"/>
           </a:p>
-        </p:txBody>
-      </p:sp>
-      <p:sp>
-        <p:nvSpPr>
-          <p:cNvPr id="3" name="Content Placeholder 2"/>
-          <p:cNvSpPr>
-            <a:spLocks noGrp="1"/>
-          </p:cNvSpPr>
-          <p:nvPr>
-            <p:ph idx="1"/>
-          </p:nvPr>
-        </p:nvSpPr>
-        <p:spPr>
-          <a:xfrm>
-            <a:off x="457200" y="1600200"/>
-            <a:ext cx="8229600" cy="4711700"/>
-          </a:xfrm>
-        </p:spPr>
-        <p:txBody>
-          <a:bodyPr>
-            <a:normAutofit fontScale="92500" lnSpcReduction="10000"/>
-          </a:bodyPr>
-          <a:lstStyle/>
-          <a:p>
-            <a:r>
-              <a:rPr lang="en-US" dirty="0" smtClean="0"/>
-              <a:t>An </a:t>
+          <a:p>
+            <a:r>
+              <a:rPr lang="en-US" dirty="0" smtClean="0"/>
+              <a:t>Standard </a:t>
             </a:r>
             <a:r>
               <a:rPr lang="en-US" dirty="0"/>
-              <a:t>article is a stream of </a:t>
-            </a:r>
-            <a:r>
-              <a:rPr lang="en-US" b="1" dirty="0"/>
-              <a:t>text </a:t>
-            </a:r>
+              <a:t>means of </a:t>
+            </a:r>
+            <a:r>
+              <a:rPr lang="en-US" dirty="0" smtClean="0"/>
+              <a:t>distribution</a:t>
+            </a:r>
+          </a:p>
+          <a:p>
             <a:r>
               <a:rPr lang="en-US" dirty="0"/>
-              <a:t>and </a:t>
-            </a:r>
-            <a:r>
-              <a:rPr lang="en-US" b="1" dirty="0" smtClean="0"/>
-              <a:t>code</a:t>
-            </a:r>
-            <a:endParaRPr lang="en-US" b="1" dirty="0"/>
-          </a:p>
-          <a:p>
-            <a:r>
-              <a:rPr lang="en-US" dirty="0" smtClean="0"/>
-              <a:t>Analysis </a:t>
-            </a:r>
-            <a:r>
-              <a:rPr lang="en-US" dirty="0"/>
-              <a:t>code is divided into text and </a:t>
-            </a:r>
-            <a:r>
-              <a:rPr lang="en-US" dirty="0" smtClean="0"/>
-              <a:t>code “</a:t>
-            </a:r>
-            <a:r>
-              <a:rPr lang="en-US" dirty="0"/>
-              <a:t>chunks</a:t>
-            </a:r>
-            <a:r>
-              <a:rPr lang="en-US" dirty="0" smtClean="0"/>
-              <a:t>”</a:t>
+              <a:t>Documentation of code and </a:t>
+            </a:r>
+            <a:r>
+              <a:rPr lang="en-US" dirty="0" smtClean="0"/>
+              <a:t>data</a:t>
             </a:r>
             <a:endParaRPr lang="en-US" dirty="0"/>
-          </a:p>
-          <a:p>
-            <a:r>
-              <a:rPr lang="en-US" dirty="0" smtClean="0"/>
-              <a:t>Each </a:t>
-            </a:r>
-            <a:r>
-              <a:rPr lang="en-US" dirty="0"/>
-              <a:t>code chunk loads data and computes </a:t>
-            </a:r>
-            <a:r>
-              <a:rPr lang="en-US" dirty="0" smtClean="0"/>
-              <a:t>results</a:t>
-            </a:r>
-          </a:p>
-          <a:p>
-            <a:r>
-              <a:rPr lang="en-US" dirty="0" smtClean="0"/>
-              <a:t>Presentation </a:t>
-            </a:r>
-            <a:r>
-              <a:rPr lang="en-US" dirty="0"/>
-              <a:t>code formats results (tables, figures, etc.</a:t>
-            </a:r>
-            <a:r>
-              <a:rPr lang="en-US" dirty="0" smtClean="0"/>
-              <a:t>)</a:t>
-            </a:r>
-          </a:p>
-          <a:p>
-            <a:r>
-              <a:rPr lang="en-US" dirty="0" smtClean="0"/>
-              <a:t>Article </a:t>
-            </a:r>
-            <a:r>
-              <a:rPr lang="en-US" dirty="0"/>
-              <a:t>text explains what is going </a:t>
-            </a:r>
-            <a:r>
-              <a:rPr lang="en-US" dirty="0" smtClean="0"/>
-              <a:t>on</a:t>
-            </a:r>
-          </a:p>
-          <a:p>
-            <a:r>
-              <a:rPr lang="en-US" dirty="0" smtClean="0"/>
-              <a:t>Literate </a:t>
-            </a:r>
-            <a:r>
-              <a:rPr lang="en-US" dirty="0"/>
-              <a:t>programs can be </a:t>
-            </a:r>
-            <a:r>
-              <a:rPr lang="en-US" b="1" dirty="0"/>
-              <a:t>weaved </a:t>
-            </a:r>
-            <a:r>
-              <a:rPr lang="en-US" dirty="0"/>
-              <a:t>to produce human-readable documents and </a:t>
-            </a:r>
-            <a:r>
-              <a:rPr lang="en-US" b="1" dirty="0"/>
-              <a:t>tangled </a:t>
-            </a:r>
-            <a:r>
-              <a:rPr lang="en-US" dirty="0"/>
-              <a:t>to produce machine-readable documents</a:t>
-            </a:r>
           </a:p>
         </p:txBody>
       </p:sp>
     </p:spTree>
     <p:extLst>
       <p:ext uri="{BB962C8B-B14F-4D97-AF65-F5344CB8AC3E}">
-        <p14:creationId xmlns:p14="http://schemas.microsoft.com/office/powerpoint/2010/main" val="504053543"/>
+        <p14:creationId xmlns:p14="http://schemas.microsoft.com/office/powerpoint/2010/main" val="3447327430"/>
       </p:ext>
     </p:extLst>
   </p:cSld>
   <p:clrMapOvr>
     <a:masterClrMapping/>
   </p:clrMapOvr>
-  <p:timing>
-    <p:tnLst>
-      <p:par>
-        <p:cTn xmlns:p14="http://schemas.microsoft.com/office/powerpoint/2010/main" id="1" dur="indefinite" restart="never" nodeType="tmRoot"/>
-      </p:par>
-    </p:tnLst>
-  </p:timing>
 </p:sld>
 </file>
 
@@ -4094,7 +4070,7 @@
         <p:spPr>
           <a:xfrm>
             <a:off x="457200" y="1600200"/>
-            <a:ext cx="8229600" cy="4902200"/>
+            <a:ext cx="8229600" cy="4711700"/>
           </a:xfrm>
         </p:spPr>
         <p:txBody>
@@ -4104,177 +4080,124 @@
           <a:lstStyle/>
           <a:p>
             <a:r>
+              <a:rPr lang="en-US" dirty="0" smtClean="0"/>
+              <a:t>An </a:t>
+            </a:r>
+            <a:r>
               <a:rPr lang="en-US" dirty="0"/>
-              <a:t>Literate programming is a general </a:t>
-            </a:r>
-            <a:r>
-              <a:rPr lang="en-US" dirty="0" smtClean="0"/>
-              <a:t>concept that requires</a:t>
-            </a:r>
-          </a:p>
-          <a:p>
-            <a:pPr marL="971550" lvl="1" indent="-514350">
-              <a:buFont typeface="+mj-lt"/>
-              <a:buAutoNum type="arabicPeriod"/>
-            </a:pPr>
-            <a:r>
-              <a:rPr lang="en-US" dirty="0" smtClean="0"/>
-              <a:t>A </a:t>
+              <a:t>article is a stream of </a:t>
+            </a:r>
+            <a:r>
+              <a:rPr lang="en-US" b="1" dirty="0"/>
+              <a:t>text </a:t>
             </a:r>
             <a:r>
               <a:rPr lang="en-US" dirty="0"/>
-              <a:t>documentation language (human readable</a:t>
+              <a:t>and </a:t>
+            </a:r>
+            <a:r>
+              <a:rPr lang="en-US" b="1" dirty="0" smtClean="0"/>
+              <a:t>code</a:t>
+            </a:r>
+            <a:endParaRPr lang="en-US" b="1" dirty="0"/>
+          </a:p>
+          <a:p>
+            <a:r>
+              <a:rPr lang="en-US" dirty="0" smtClean="0"/>
+              <a:t>Analysis </a:t>
+            </a:r>
+            <a:r>
+              <a:rPr lang="en-US" dirty="0"/>
+              <a:t>code is divided into text and </a:t>
+            </a:r>
+            <a:r>
+              <a:rPr lang="en-US" dirty="0" smtClean="0"/>
+              <a:t>code “</a:t>
+            </a:r>
+            <a:r>
+              <a:rPr lang="en-US" dirty="0"/>
+              <a:t>chunks</a:t>
+            </a:r>
+            <a:r>
+              <a:rPr lang="en-US" dirty="0" smtClean="0"/>
+              <a:t>”</a:t>
+            </a:r>
+            <a:endParaRPr lang="en-US" dirty="0"/>
+          </a:p>
+          <a:p>
+            <a:r>
+              <a:rPr lang="en-US" dirty="0" smtClean="0"/>
+              <a:t>Each </a:t>
+            </a:r>
+            <a:r>
+              <a:rPr lang="en-US" dirty="0"/>
+              <a:t>code chunk loads data and computes </a:t>
+            </a:r>
+            <a:r>
+              <a:rPr lang="en-US" dirty="0" smtClean="0"/>
+              <a:t>results</a:t>
+            </a:r>
+          </a:p>
+          <a:p>
+            <a:r>
+              <a:rPr lang="en-US" dirty="0" smtClean="0"/>
+              <a:t>Presentation </a:t>
+            </a:r>
+            <a:r>
+              <a:rPr lang="en-US" dirty="0"/>
+              <a:t>code formats results (tables, figures, etc.</a:t>
             </a:r>
             <a:r>
               <a:rPr lang="en-US" dirty="0" smtClean="0"/>
               <a:t>)</a:t>
             </a:r>
-            <a:endParaRPr lang="en-US" dirty="0"/>
-          </a:p>
-          <a:p>
-            <a:pPr marL="971550" lvl="1" indent="-514350">
-              <a:buFont typeface="+mj-lt"/>
-              <a:buAutoNum type="arabicPeriod"/>
-            </a:pPr>
-            <a:r>
-              <a:rPr lang="en-US" dirty="0" smtClean="0"/>
-              <a:t>A </a:t>
+          </a:p>
+          <a:p>
+            <a:r>
+              <a:rPr lang="en-US" dirty="0" smtClean="0"/>
+              <a:t>Article </a:t>
             </a:r>
             <a:r>
               <a:rPr lang="en-US" dirty="0"/>
-              <a:t>programming language (machine readable</a:t>
-            </a:r>
-            <a:r>
-              <a:rPr lang="en-US" dirty="0" smtClean="0"/>
-              <a:t>)</a:t>
-            </a:r>
-          </a:p>
-          <a:p>
-            <a:pPr marL="571500" indent="-514350"/>
-            <a:r>
-              <a:rPr lang="en-US" dirty="0" err="1" smtClean="0"/>
-              <a:t>Sweave</a:t>
-            </a:r>
-            <a:r>
-              <a:rPr lang="en-US" dirty="0" smtClean="0"/>
-              <a:t> uses </a:t>
+              <a:t>text explains what is going </a:t>
+            </a:r>
+            <a:r>
+              <a:rPr lang="en-US" dirty="0" smtClean="0"/>
+              <a:t>on</a:t>
+            </a:r>
+          </a:p>
+          <a:p>
+            <a:r>
+              <a:rPr lang="en-US" dirty="0" smtClean="0"/>
+              <a:t>Literate </a:t>
             </a:r>
             <a:r>
               <a:rPr lang="en-US" dirty="0"/>
-              <a:t>L</a:t>
-            </a:r>
-            <a:r>
-              <a:rPr lang="en-US" baseline="30000" dirty="0"/>
-              <a:t>A</a:t>
+              <a:t>programs can be </a:t>
+            </a:r>
+            <a:r>
+              <a:rPr lang="en-US" b="1" dirty="0"/>
+              <a:t>weaved </a:t>
             </a:r>
             <a:r>
               <a:rPr lang="en-US" dirty="0"/>
-              <a:t>T</a:t>
-            </a:r>
-            <a:r>
-              <a:rPr lang="en-US" baseline="-25000" dirty="0"/>
-              <a:t>E</a:t>
+              <a:t>to produce human-readable documents and </a:t>
+            </a:r>
+            <a:r>
+              <a:rPr lang="en-US" b="1" dirty="0"/>
+              <a:t>tangled </a:t>
             </a:r>
             <a:r>
               <a:rPr lang="en-US" dirty="0"/>
-              <a:t>X and R as</a:t>
-            </a:r>
-            <a:r>
-              <a:rPr lang="en-US" dirty="0" smtClean="0"/>
-              <a:t> the documentation </a:t>
-            </a:r>
-            <a:r>
-              <a:rPr lang="en-US" dirty="0"/>
-              <a:t>and programming </a:t>
-            </a:r>
-            <a:r>
-              <a:rPr lang="en-US" dirty="0" smtClean="0"/>
-              <a:t>languages</a:t>
-            </a:r>
-          </a:p>
-          <a:p>
-            <a:pPr marL="571500" indent="-514350"/>
-            <a:r>
-              <a:rPr lang="en-US" dirty="0" err="1" smtClean="0"/>
-              <a:t>Sweave</a:t>
-            </a:r>
-            <a:r>
-              <a:rPr lang="en-US" dirty="0" smtClean="0"/>
-              <a:t> was developed </a:t>
-            </a:r>
-            <a:r>
-              <a:rPr lang="en-US" dirty="0"/>
-              <a:t>by Friedrich </a:t>
-            </a:r>
-            <a:r>
-              <a:rPr lang="en-US" dirty="0" err="1"/>
-              <a:t>Leisch</a:t>
-            </a:r>
-            <a:r>
-              <a:rPr lang="en-US" dirty="0"/>
-              <a:t> (member of the R </a:t>
-            </a:r>
-            <a:r>
-              <a:rPr lang="en-US" dirty="0" smtClean="0"/>
-              <a:t>Core) and is maintained by R core</a:t>
-            </a:r>
-          </a:p>
-          <a:p>
-            <a:pPr marL="571500" indent="-514350"/>
-            <a:r>
-              <a:rPr lang="en-US" dirty="0" smtClean="0"/>
-              <a:t>Main </a:t>
-            </a:r>
-            <a:r>
-              <a:rPr lang="en-US" dirty="0"/>
-              <a:t>web site: </a:t>
-            </a:r>
-            <a:r>
-              <a:rPr lang="en-US" sz="2824" dirty="0">
-                <a:latin typeface="Courier New"/>
-                <a:cs typeface="Courier New"/>
-              </a:rPr>
-              <a:t>http://</a:t>
-            </a:r>
-            <a:r>
-              <a:rPr lang="en-US" sz="2824" dirty="0" err="1">
-                <a:latin typeface="Courier New"/>
-                <a:cs typeface="Courier New"/>
-              </a:rPr>
-              <a:t>www.statistik.lmu.de</a:t>
-            </a:r>
-            <a:r>
-              <a:rPr lang="en-US" sz="2824" dirty="0">
-                <a:latin typeface="Courier New"/>
-                <a:cs typeface="Courier New"/>
-              </a:rPr>
-              <a:t>/ </a:t>
-            </a:r>
-            <a:r>
-              <a:rPr lang="en-US" sz="2824" dirty="0" err="1">
-                <a:latin typeface="Courier New"/>
-                <a:cs typeface="Courier New"/>
-              </a:rPr>
-              <a:t>̃leisch/</a:t>
-            </a:r>
-            <a:r>
-              <a:rPr lang="en-US" sz="2824" dirty="0" err="1" smtClean="0">
-                <a:latin typeface="Courier New"/>
-                <a:cs typeface="Courier New"/>
-              </a:rPr>
-              <a:t>Sweave</a:t>
-            </a:r>
-            <a:endParaRPr lang="en-US" dirty="0" smtClean="0">
-              <a:latin typeface="Courier New"/>
-              <a:cs typeface="Courier New"/>
-            </a:endParaRPr>
+              <a:t>to produce machine-readable documents</a:t>
+            </a:r>
           </a:p>
         </p:txBody>
       </p:sp>
     </p:spTree>
     <p:extLst>
       <p:ext uri="{BB962C8B-B14F-4D97-AF65-F5344CB8AC3E}">
-        <p14:creationId xmlns:p14="http://schemas.microsoft.com/office/powerpoint/2010/main" val="2037623854"/>
+        <p14:creationId xmlns:p14="http://schemas.microsoft.com/office/powerpoint/2010/main" val="504053543"/>
       </p:ext>
     </p:extLst>
   </p:cSld>
@@ -4324,85 +4247,220 @@
           <a:lstStyle/>
           <a:p>
             <a:r>
+              <a:rPr lang="en-US" dirty="0" smtClean="0"/>
+              <a:t>Literate (Statistical) Programming</a:t>
+            </a:r>
+            <a:endParaRPr lang="en-US" dirty="0"/>
+          </a:p>
+        </p:txBody>
+      </p:sp>
+      <p:sp>
+        <p:nvSpPr>
+          <p:cNvPr id="3" name="Content Placeholder 2"/>
+          <p:cNvSpPr>
+            <a:spLocks noGrp="1"/>
+          </p:cNvSpPr>
+          <p:nvPr>
+            <p:ph idx="1"/>
+          </p:nvPr>
+        </p:nvSpPr>
+        <p:spPr>
+          <a:xfrm>
+            <a:off x="457200" y="1600200"/>
+            <a:ext cx="8229600" cy="4902200"/>
+          </a:xfrm>
+        </p:spPr>
+        <p:txBody>
+          <a:bodyPr>
+            <a:normAutofit fontScale="92500" lnSpcReduction="10000"/>
+          </a:bodyPr>
+          <a:lstStyle/>
+          <a:p>
+            <a:r>
+              <a:rPr lang="en-US" dirty="0"/>
+              <a:t>Literate programming is a general </a:t>
+            </a:r>
+            <a:r>
+              <a:rPr lang="en-US" dirty="0" smtClean="0"/>
+              <a:t>concept that requires</a:t>
+            </a:r>
+          </a:p>
+          <a:p>
+            <a:pPr marL="971550" lvl="1" indent="-514350">
+              <a:buFont typeface="+mj-lt"/>
+              <a:buAutoNum type="arabicPeriod"/>
+            </a:pPr>
+            <a:r>
+              <a:rPr lang="en-US" dirty="0" smtClean="0"/>
+              <a:t>A </a:t>
+            </a:r>
+            <a:r>
+              <a:rPr lang="en-US" dirty="0"/>
+              <a:t>documentation language (human readable</a:t>
+            </a:r>
+            <a:r>
+              <a:rPr lang="en-US" dirty="0" smtClean="0"/>
+              <a:t>)</a:t>
+            </a:r>
+            <a:endParaRPr lang="en-US" dirty="0"/>
+          </a:p>
+          <a:p>
+            <a:pPr marL="971550" lvl="1" indent="-514350">
+              <a:buFont typeface="+mj-lt"/>
+              <a:buAutoNum type="arabicPeriod"/>
+            </a:pPr>
+            <a:r>
+              <a:rPr lang="en-US" dirty="0" smtClean="0"/>
+              <a:t>A </a:t>
+            </a:r>
+            <a:r>
+              <a:rPr lang="en-US" dirty="0"/>
+              <a:t>programming language (machine readable</a:t>
+            </a:r>
+            <a:r>
+              <a:rPr lang="en-US" dirty="0" smtClean="0"/>
+              <a:t>)</a:t>
+            </a:r>
+          </a:p>
+          <a:p>
+            <a:pPr marL="571500" indent="-514350"/>
+            <a:r>
               <a:rPr lang="en-US" dirty="0" err="1" smtClean="0"/>
               <a:t>Sweave</a:t>
             </a:r>
             <a:r>
               <a:rPr lang="en-US" dirty="0" smtClean="0"/>
-              <a:t> Limitations</a:t>
-            </a:r>
-            <a:endParaRPr lang="en-US" dirty="0"/>
-          </a:p>
-        </p:txBody>
-      </p:sp>
-      <p:sp>
-        <p:nvSpPr>
-          <p:cNvPr id="3" name="Content Placeholder 2"/>
-          <p:cNvSpPr>
-            <a:spLocks noGrp="1"/>
-          </p:cNvSpPr>
-          <p:nvPr>
-            <p:ph idx="1"/>
-          </p:nvPr>
-        </p:nvSpPr>
-        <p:spPr/>
-        <p:txBody>
-          <a:bodyPr/>
-          <a:lstStyle/>
-          <a:p>
+              <a:t> uses </a:t>
+            </a:r>
+            <a:r>
+              <a:rPr lang="en-US" dirty="0"/>
+              <a:t>L</a:t>
+            </a:r>
+            <a:r>
+              <a:rPr lang="en-US" baseline="30000" dirty="0"/>
+              <a:t>A</a:t>
+            </a:r>
+            <a:r>
+              <a:rPr lang="en-US" dirty="0"/>
+              <a:t>T</a:t>
+            </a:r>
+            <a:r>
+              <a:rPr lang="en-US" baseline="-25000" dirty="0"/>
+              <a:t>E</a:t>
+            </a:r>
+            <a:r>
+              <a:rPr lang="en-US" dirty="0"/>
+              <a:t>X and R as</a:t>
+            </a:r>
+            <a:r>
+              <a:rPr lang="en-US" dirty="0" smtClean="0"/>
+              <a:t> the documentation </a:t>
+            </a:r>
+            <a:r>
+              <a:rPr lang="en-US" dirty="0"/>
+              <a:t>and programming </a:t>
+            </a:r>
+            <a:r>
+              <a:rPr lang="en-US" dirty="0" smtClean="0"/>
+              <a:t>languages</a:t>
+            </a:r>
+          </a:p>
+          <a:p>
+            <a:pPr marL="571500" indent="-514350"/>
             <a:r>
               <a:rPr lang="en-US" dirty="0" err="1" smtClean="0"/>
               <a:t>Sweave</a:t>
             </a:r>
             <a:r>
               <a:rPr lang="en-US" dirty="0" smtClean="0"/>
-              <a:t> has many limitations</a:t>
-            </a:r>
-          </a:p>
-          <a:p>
-            <a:r>
-              <a:rPr lang="en-US" dirty="0" smtClean="0"/>
-              <a:t>Focused primarily on </a:t>
-            </a:r>
-            <a:r>
-              <a:rPr lang="en-US" dirty="0" err="1" smtClean="0"/>
-              <a:t>LaTeX</a:t>
-            </a:r>
-            <a:r>
-              <a:rPr lang="en-US" dirty="0" smtClean="0"/>
-              <a:t>, a difficult to learn markup language used only by </a:t>
-            </a:r>
-            <a:r>
-              <a:rPr lang="en-US" dirty="0" err="1" smtClean="0"/>
-              <a:t>weirdos</a:t>
-            </a:r>
-            <a:endParaRPr lang="en-US" dirty="0" smtClean="0"/>
-          </a:p>
-          <a:p>
-            <a:r>
-              <a:rPr lang="en-US" dirty="0" smtClean="0"/>
-              <a:t>Lacks features like caching, multiple plots per chunk, mixing programming languages and many other technical items</a:t>
-            </a:r>
-          </a:p>
-          <a:p>
-            <a:r>
-              <a:rPr lang="en-US" dirty="0" smtClean="0"/>
-              <a:t>Not frequently updated or very actively developed</a:t>
-            </a:r>
-            <a:endParaRPr lang="en-US" dirty="0"/>
+              <a:t> was developed </a:t>
+            </a:r>
+            <a:r>
+              <a:rPr lang="en-US" dirty="0"/>
+              <a:t>by Friedrich </a:t>
+            </a:r>
+            <a:r>
+              <a:rPr lang="en-US" dirty="0" err="1"/>
+              <a:t>Leisch</a:t>
+            </a:r>
+            <a:r>
+              <a:rPr lang="en-US" dirty="0"/>
+              <a:t> (member of the R </a:t>
+            </a:r>
+            <a:r>
+              <a:rPr lang="en-US" dirty="0" smtClean="0"/>
+              <a:t>Core) and is maintained by R core</a:t>
+            </a:r>
+          </a:p>
+          <a:p>
+            <a:pPr marL="571500" indent="-514350"/>
+            <a:r>
+              <a:rPr lang="en-US" dirty="0" smtClean="0"/>
+              <a:t>Main </a:t>
+            </a:r>
+            <a:r>
+              <a:rPr lang="en-US" dirty="0"/>
+              <a:t>web site: </a:t>
+            </a:r>
+            <a:r>
+              <a:rPr lang="en-US" sz="2824" dirty="0">
+                <a:latin typeface="Courier New"/>
+                <a:cs typeface="Courier New"/>
+              </a:rPr>
+              <a:t>http://</a:t>
+            </a:r>
+            <a:r>
+              <a:rPr lang="en-US" sz="2824" dirty="0" err="1">
+                <a:latin typeface="Courier New"/>
+                <a:cs typeface="Courier New"/>
+              </a:rPr>
+              <a:t>www.statistik.lmu.de</a:t>
+            </a:r>
+            <a:r>
+              <a:rPr lang="en-US" sz="2824" dirty="0">
+                <a:latin typeface="Courier New"/>
+                <a:cs typeface="Courier New"/>
+              </a:rPr>
+              <a:t>/ </a:t>
+            </a:r>
+            <a:r>
+              <a:rPr lang="en-US" sz="2824" dirty="0" err="1">
+                <a:latin typeface="Courier New"/>
+                <a:cs typeface="Courier New"/>
+              </a:rPr>
+              <a:t>̃leisch/</a:t>
+            </a:r>
+            <a:r>
+              <a:rPr lang="en-US" sz="2824" dirty="0" err="1" smtClean="0">
+                <a:latin typeface="Courier New"/>
+                <a:cs typeface="Courier New"/>
+              </a:rPr>
+              <a:t>Sweave</a:t>
+            </a:r>
+            <a:endParaRPr lang="en-US" dirty="0" smtClean="0">
+              <a:latin typeface="Courier New"/>
+              <a:cs typeface="Courier New"/>
+            </a:endParaRPr>
           </a:p>
         </p:txBody>
       </p:sp>
     </p:spTree>
     <p:extLst>
       <p:ext uri="{BB962C8B-B14F-4D97-AF65-F5344CB8AC3E}">
-        <p14:creationId xmlns:p14="http://schemas.microsoft.com/office/powerpoint/2010/main" val="1718983525"/>
+        <p14:creationId xmlns:p14="http://schemas.microsoft.com/office/powerpoint/2010/main" val="2037623854"/>
       </p:ext>
     </p:extLst>
   </p:cSld>
   <p:clrMapOvr>
     <a:masterClrMapping/>
   </p:clrMapOvr>
+  <p:timing>
+    <p:tnLst>
+      <p:par>
+        <p:cTn xmlns:p14="http://schemas.microsoft.com/office/powerpoint/2010/main" id="1" dur="indefinite" restart="never" nodeType="tmRoot"/>
+      </p:par>
+    </p:tnLst>
+  </p:timing>
 </p:sld>
 </file>
 
@@ -4439,119 +4497,70 @@
           <a:lstStyle/>
           <a:p>
             <a:r>
-              <a:rPr lang="en-US" dirty="0"/>
-              <a:t>Literate (Statistical) Programming</a:t>
-            </a:r>
-          </a:p>
-        </p:txBody>
-      </p:sp>
-      <p:sp>
-        <p:nvSpPr>
-          <p:cNvPr id="3" name="Content Placeholder 2"/>
-          <p:cNvSpPr>
-            <a:spLocks noGrp="1"/>
-          </p:cNvSpPr>
-          <p:nvPr>
-            <p:ph idx="1"/>
-          </p:nvPr>
-        </p:nvSpPr>
-        <p:spPr/>
-        <p:txBody>
-          <a:bodyPr>
-            <a:normAutofit fontScale="92500" lnSpcReduction="20000"/>
-          </a:bodyPr>
-          <a:lstStyle/>
-          <a:p>
-            <a:r>
-              <a:rPr lang="en-US" b="1" dirty="0" err="1" smtClean="0"/>
-              <a:t>knitr</a:t>
-            </a:r>
-            <a:r>
-              <a:rPr lang="en-US" dirty="0" smtClean="0"/>
-              <a:t> is an alternative (more recent) package</a:t>
-            </a:r>
-          </a:p>
-          <a:p>
-            <a:r>
-              <a:rPr lang="en-US" dirty="0" smtClean="0"/>
-              <a:t>Brings together many features added on to </a:t>
-            </a:r>
-            <a:r>
               <a:rPr lang="en-US" dirty="0" err="1" smtClean="0"/>
               <a:t>Sweave</a:t>
             </a:r>
             <a:r>
               <a:rPr lang="en-US" dirty="0" smtClean="0"/>
-              <a:t> to address limitations</a:t>
-            </a:r>
-          </a:p>
+              <a:t> Limitations</a:t>
+            </a:r>
+            <a:endParaRPr lang="en-US" dirty="0"/>
+          </a:p>
+        </p:txBody>
+      </p:sp>
+      <p:sp>
+        <p:nvSpPr>
+          <p:cNvPr id="3" name="Content Placeholder 2"/>
+          <p:cNvSpPr>
+            <a:spLocks noGrp="1"/>
+          </p:cNvSpPr>
+          <p:nvPr>
+            <p:ph idx="1"/>
+          </p:nvPr>
+        </p:nvSpPr>
+        <p:spPr/>
+        <p:txBody>
+          <a:bodyPr/>
+          <a:lstStyle/>
           <a:p>
             <a:r>
               <a:rPr lang="en-US" dirty="0" err="1" smtClean="0"/>
-              <a:t>knitr</a:t>
-            </a:r>
-            <a:r>
-              <a:rPr lang="en-US" dirty="0" smtClean="0"/>
-              <a:t> uses R as the programming language (although others are allowed) and variety of documentation languages</a:t>
-            </a:r>
-          </a:p>
-          <a:p>
-            <a:pPr lvl="1"/>
+              <a:t>Sweave</a:t>
+            </a:r>
+            <a:r>
+              <a:rPr lang="en-US" dirty="0" smtClean="0"/>
+              <a:t> has many limitations</a:t>
+            </a:r>
+          </a:p>
+          <a:p>
+            <a:r>
+              <a:rPr lang="en-US" dirty="0" smtClean="0"/>
+              <a:t>Focused primarily on </a:t>
+            </a:r>
             <a:r>
               <a:rPr lang="en-US" dirty="0" err="1" smtClean="0"/>
               <a:t>LaTeX</a:t>
             </a:r>
             <a:r>
               <a:rPr lang="en-US" dirty="0" smtClean="0"/>
-              <a:t>, Markdown, HTML</a:t>
-            </a:r>
-          </a:p>
-          <a:p>
+              <a:t>, a difficult to learn markup language used only by </a:t>
+            </a:r>
             <a:r>
               <a:rPr lang="en-US" dirty="0" err="1" smtClean="0"/>
-              <a:t>knitr</a:t>
-            </a:r>
-            <a:r>
-              <a:rPr lang="en-US" dirty="0" smtClean="0"/>
-              <a:t> was developed by </a:t>
-            </a:r>
-            <a:r>
-              <a:rPr lang="en-US" dirty="0" err="1" smtClean="0"/>
-              <a:t>Yihui</a:t>
-            </a:r>
-            <a:r>
-              <a:rPr lang="en-US" dirty="0" smtClean="0"/>
-              <a:t> </a:t>
-            </a:r>
-            <a:r>
-              <a:rPr lang="en-US" dirty="0" err="1" smtClean="0"/>
-              <a:t>Xie</a:t>
-            </a:r>
-            <a:r>
-              <a:rPr lang="en-US" dirty="0" smtClean="0"/>
-              <a:t> (graduate student in statistics at Iowa State)</a:t>
-            </a:r>
-          </a:p>
-          <a:p>
-            <a:r>
-              <a:rPr lang="en-US" dirty="0"/>
-              <a:t>See </a:t>
-            </a:r>
-            <a:r>
-              <a:rPr lang="en-US" dirty="0">
-                <a:hlinkClick r:id="rId2"/>
-              </a:rPr>
-              <a:t>http://yihui.name/knitr</a:t>
-            </a:r>
-            <a:r>
-              <a:rPr lang="en-US" dirty="0" smtClean="0">
-                <a:hlinkClick r:id="rId2"/>
-              </a:rPr>
-              <a:t>/</a:t>
-            </a:r>
-            <a:r>
-              <a:rPr lang="en-US" dirty="0" smtClean="0"/>
-              <a:t>	</a:t>
+              <a:t>weirdos</a:t>
+            </a:r>
+            <a:endParaRPr lang="en-US" dirty="0" smtClean="0"/>
+          </a:p>
+          <a:p>
+            <a:r>
+              <a:rPr lang="en-US" dirty="0" smtClean="0"/>
+              <a:t>Lacks features like caching, multiple plots per chunk, mixing programming languages and many other technical items</a:t>
+            </a:r>
+          </a:p>
+          <a:p>
+            <a:r>
+              <a:rPr lang="en-US" dirty="0" smtClean="0"/>
+              <a:t>Not frequently updated or very actively developed</a:t>
             </a:r>
             <a:endParaRPr lang="en-US" dirty="0"/>
           </a:p>
@@ -4560,7 +4569,7 @@
     </p:spTree>
     <p:extLst>
       <p:ext uri="{BB962C8B-B14F-4D97-AF65-F5344CB8AC3E}">
-        <p14:creationId xmlns:p14="http://schemas.microsoft.com/office/powerpoint/2010/main" val="551242101"/>
+        <p14:creationId xmlns:p14="http://schemas.microsoft.com/office/powerpoint/2010/main" val="1718983525"/>
       </p:ext>
     </p:extLst>
   </p:cSld>
@@ -4604,77 +4613,127 @@
           <a:p>
             <a:r>
               <a:rPr lang="en-US" dirty="0"/>
-              <a:t>What is </a:t>
-            </a:r>
+              <a:t>Literate (Statistical) Programming</a:t>
+            </a:r>
+          </a:p>
+        </p:txBody>
+      </p:sp>
+      <p:sp>
+        <p:nvSpPr>
+          <p:cNvPr id="3" name="Content Placeholder 2"/>
+          <p:cNvSpPr>
+            <a:spLocks noGrp="1"/>
+          </p:cNvSpPr>
+          <p:nvPr>
+            <p:ph idx="1"/>
+          </p:nvPr>
+        </p:nvSpPr>
+        <p:spPr/>
+        <p:txBody>
+          <a:bodyPr>
+            <a:normAutofit fontScale="92500" lnSpcReduction="20000"/>
+          </a:bodyPr>
+          <a:lstStyle/>
+          <a:p>
+            <a:r>
+              <a:rPr lang="en-US" b="1" dirty="0" err="1" smtClean="0"/>
+              <a:t>knitr</a:t>
+            </a:r>
+            <a:r>
+              <a:rPr lang="en-US" dirty="0" smtClean="0"/>
+              <a:t> is an alternative (more recent) package</a:t>
+            </a:r>
+          </a:p>
+          <a:p>
+            <a:r>
+              <a:rPr lang="en-US" dirty="0" smtClean="0"/>
+              <a:t>Brings together many features added on to </a:t>
+            </a:r>
+            <a:r>
+              <a:rPr lang="en-US" dirty="0" err="1" smtClean="0"/>
+              <a:t>Sweave</a:t>
+            </a:r>
+            <a:r>
+              <a:rPr lang="en-US" dirty="0" smtClean="0"/>
+              <a:t> to address limitations</a:t>
+            </a:r>
+          </a:p>
+          <a:p>
             <a:r>
               <a:rPr lang="en-US" dirty="0" err="1" smtClean="0"/>
               <a:t>knitr</a:t>
             </a:r>
             <a:r>
+              <a:rPr lang="en-US" dirty="0" smtClean="0"/>
+              <a:t> uses R as the programming language (although others are allowed) and variety of documentation languages</a:t>
+            </a:r>
+          </a:p>
+          <a:p>
+            <a:pPr lvl="1"/>
+            <a:r>
+              <a:rPr lang="en-US" dirty="0" err="1" smtClean="0"/>
+              <a:t>LaTeX</a:t>
+            </a:r>
+            <a:r>
+              <a:rPr lang="en-US" dirty="0" smtClean="0"/>
+              <a:t>, Markdown, HTML</a:t>
+            </a:r>
+          </a:p>
+          <a:p>
+            <a:r>
+              <a:rPr lang="en-US" dirty="0" err="1" smtClean="0"/>
+              <a:t>knitr</a:t>
+            </a:r>
+            <a:r>
+              <a:rPr lang="en-US" dirty="0" smtClean="0"/>
+              <a:t> was developed by </a:t>
+            </a:r>
+            <a:r>
+              <a:rPr lang="en-US" dirty="0" err="1" smtClean="0"/>
+              <a:t>Yihui</a:t>
+            </a:r>
+            <a:r>
+              <a:rPr lang="en-US" dirty="0" smtClean="0"/>
+              <a:t> </a:t>
+            </a:r>
+            <a:r>
+              <a:rPr lang="en-US" dirty="0" err="1" smtClean="0"/>
+              <a:t>Xie</a:t>
+            </a:r>
+            <a:r>
+              <a:rPr lang="en-US" dirty="0" smtClean="0"/>
+              <a:t> (graduate student in statistics at Iowa State)</a:t>
+            </a:r>
+          </a:p>
+          <a:p>
+            <a:r>
               <a:rPr lang="en-US" dirty="0"/>
-              <a:t> </a:t>
-            </a:r>
-            <a:r>
-              <a:rPr lang="en-US" dirty="0" smtClean="0"/>
-              <a:t>good </a:t>
-            </a:r>
-            <a:r>
-              <a:rPr lang="en-US" dirty="0"/>
-              <a:t>for?</a:t>
-            </a:r>
-          </a:p>
-        </p:txBody>
-      </p:sp>
-      <p:sp>
-        <p:nvSpPr>
-          <p:cNvPr id="3" name="Content Placeholder 2"/>
-          <p:cNvSpPr>
-            <a:spLocks noGrp="1"/>
-          </p:cNvSpPr>
-          <p:nvPr>
-            <p:ph idx="1"/>
-          </p:nvPr>
-        </p:nvSpPr>
-        <p:spPr/>
-        <p:txBody>
-          <a:bodyPr/>
-          <a:lstStyle/>
-          <a:p>
-            <a:r>
-              <a:rPr lang="en-US" dirty="0" smtClean="0"/>
-              <a:t>Manuals</a:t>
-            </a:r>
-          </a:p>
-          <a:p>
-            <a:r>
-              <a:rPr lang="en-US" dirty="0" smtClean="0"/>
-              <a:t>Short/medium-length technical documents</a:t>
-            </a:r>
-          </a:p>
-          <a:p>
-            <a:r>
-              <a:rPr lang="en-US" dirty="0" smtClean="0"/>
-              <a:t>Tutorials</a:t>
-            </a:r>
-          </a:p>
-          <a:p>
-            <a:r>
-              <a:rPr lang="en-US" dirty="0" smtClean="0"/>
-              <a:t>Reports (esp. if generated periodically)</a:t>
-            </a:r>
-          </a:p>
-          <a:p>
-            <a:r>
-              <a:rPr lang="en-US" dirty="0" smtClean="0"/>
-              <a:t>Data preprocessing documents/summaries</a:t>
-            </a:r>
+              <a:t>See </a:t>
+            </a:r>
+            <a:r>
+              <a:rPr lang="en-US" dirty="0">
+                <a:hlinkClick r:id="rId2"/>
+              </a:rPr>
+              <a:t>http://yihui.name/knitr</a:t>
+            </a:r>
+            <a:r>
+              <a:rPr lang="en-US" dirty="0" smtClean="0">
+                <a:hlinkClick r:id="rId2"/>
+              </a:rPr>
+              <a:t>/</a:t>
+            </a:r>
+            <a:r>
+              <a:rPr lang="en-US" dirty="0" smtClean="0"/>
+              <a:t>	</a:t>
+            </a:r>
+            <a:endParaRPr lang="en-US" dirty="0"/>
           </a:p>
         </p:txBody>
       </p:sp>
     </p:spTree>
     <p:extLst>
       <p:ext uri="{BB962C8B-B14F-4D97-AF65-F5344CB8AC3E}">
-        <p14:creationId xmlns:p14="http://schemas.microsoft.com/office/powerpoint/2010/main" val="4105671185"/>
+        <p14:creationId xmlns:p14="http://schemas.microsoft.com/office/powerpoint/2010/main" val="551242101"/>
       </p:ext>
     </p:extLst>
   </p:cSld>
@@ -4854,12 +4913,8 @@
               <a:t>What is </a:t>
             </a:r>
             <a:r>
-              <a:rPr lang="en-US" dirty="0" err="1" smtClean="0"/>
-              <a:t>knitr</a:t>
-            </a:r>
-            <a:r>
-              <a:rPr lang="en-US" dirty="0" smtClean="0"/>
-              <a:t> NOT good </a:t>
+              <a:rPr lang="en-US" dirty="0" smtClean="0"/>
+              <a:t>LSP good </a:t>
             </a:r>
             <a:r>
               <a:rPr lang="en-US" dirty="0"/>
@@ -4885,39 +4940,39 @@
           <a:p>
             <a:r>
               <a:rPr lang="en-US" dirty="0" smtClean="0"/>
-              <a:t>Long research articles</a:t>
-            </a:r>
-          </a:p>
-          <a:p>
-            <a:r>
-              <a:rPr lang="en-US" dirty="0" smtClean="0"/>
-              <a:t>Complex time-consuming computations (i.e. long MCMC, optimizations)</a:t>
-            </a:r>
-          </a:p>
-          <a:p>
-            <a:r>
-              <a:rPr lang="en-US" dirty="0" smtClean="0"/>
-              <a:t>Documents that require precise formatting</a:t>
-            </a:r>
-          </a:p>
-          <a:p>
-            <a:r>
-              <a:rPr lang="en-US" dirty="0" smtClean="0"/>
-              <a:t>Books (although can be done with use of other tools)</a:t>
-            </a:r>
-          </a:p>
-          <a:p>
-            <a:pPr marL="0" indent="0">
-              <a:buNone/>
-            </a:pPr>
-            <a:endParaRPr lang="en-US" dirty="0"/>
+              <a:t>Manuals</a:t>
+            </a:r>
+          </a:p>
+          <a:p>
+            <a:r>
+              <a:rPr lang="en-US" dirty="0" smtClean="0"/>
+              <a:t>Short/medium-length technical documents</a:t>
+            </a:r>
+          </a:p>
+          <a:p>
+            <a:r>
+              <a:rPr lang="en-US" dirty="0" smtClean="0"/>
+              <a:t>Tutorials</a:t>
+            </a:r>
+          </a:p>
+          <a:p>
+            <a:r>
+              <a:rPr lang="en-US" dirty="0" smtClean="0"/>
+              <a:t>Reports (esp. if generated periodically)</a:t>
+            </a:r>
+          </a:p>
+          <a:p>
+            <a:r>
+              <a:rPr lang="en-US" dirty="0" smtClean="0"/>
+              <a:t>Data preprocessing documents/summaries</a:t>
+            </a:r>
           </a:p>
         </p:txBody>
       </p:sp>
     </p:spTree>
     <p:extLst>
       <p:ext uri="{BB962C8B-B14F-4D97-AF65-F5344CB8AC3E}">
-        <p14:creationId xmlns:p14="http://schemas.microsoft.com/office/powerpoint/2010/main" val="1200545130"/>
+        <p14:creationId xmlns:p14="http://schemas.microsoft.com/office/powerpoint/2010/main" val="4105671185"/>
       </p:ext>
     </p:extLst>
   </p:cSld>
@@ -4960,14 +5015,21 @@
           <a:lstStyle/>
           <a:p>
             <a:r>
-              <a:rPr lang="en-US" dirty="0" smtClean="0"/>
-              <a:t>Using </a:t>
-            </a:r>
-            <a:r>
-              <a:rPr lang="en-US" dirty="0" err="1" smtClean="0"/>
-              <a:t>knitr</a:t>
-            </a:r>
-            <a:endParaRPr lang="en-US" dirty="0"/>
+              <a:rPr lang="en-US" dirty="0"/>
+              <a:t>What is </a:t>
+            </a:r>
+            <a:r>
+              <a:rPr lang="en-US" dirty="0" smtClean="0"/>
+              <a:t>LSP NOT </a:t>
+            </a:r>
+            <a:r>
+              <a:rPr lang="en-US" dirty="0" smtClean="0"/>
+              <a:t>good </a:t>
+            </a:r>
+            <a:r>
+              <a:rPr lang="en-US" dirty="0"/>
+              <a:t>for?</a:t>
+            </a:r>
           </a:p>
         </p:txBody>
       </p:sp>
@@ -4983,104 +5045,36 @@
         </p:nvSpPr>
         <p:spPr/>
         <p:txBody>
-          <a:bodyPr>
-            <a:normAutofit fontScale="92500"/>
-          </a:bodyPr>
-          <a:lstStyle/>
-          <a:p>
-            <a:r>
-              <a:rPr lang="en-US" dirty="0" err="1" smtClean="0"/>
-              <a:t>Toolchain</a:t>
-            </a:r>
-            <a:endParaRPr lang="en-US" dirty="0" smtClean="0"/>
-          </a:p>
-          <a:p>
-            <a:pPr lvl="1"/>
-            <a:r>
-              <a:rPr lang="en-US" dirty="0" smtClean="0"/>
-              <a:t>Text editor</a:t>
-            </a:r>
-          </a:p>
-          <a:p>
-            <a:pPr lvl="1"/>
-            <a:r>
-              <a:rPr lang="en-US" dirty="0" smtClean="0"/>
-              <a:t>R</a:t>
-            </a:r>
-          </a:p>
-          <a:p>
-            <a:pPr lvl="1"/>
-            <a:r>
-              <a:rPr lang="en-US" dirty="0" err="1" smtClean="0"/>
-              <a:t>knitr</a:t>
-            </a:r>
-            <a:r>
-              <a:rPr lang="en-US" dirty="0" smtClean="0"/>
-              <a:t> package (from CRAN via </a:t>
-            </a:r>
-            <a:r>
-              <a:rPr lang="en-US" dirty="0" err="1" smtClean="0">
-                <a:latin typeface="Courier"/>
-                <a:cs typeface="Courier"/>
-              </a:rPr>
-              <a:t>install.packages</a:t>
-            </a:r>
-            <a:r>
-              <a:rPr lang="en-US" dirty="0" smtClean="0"/>
-              <a:t>)</a:t>
-            </a:r>
-          </a:p>
-          <a:p>
-            <a:pPr lvl="1"/>
-            <a:r>
-              <a:rPr lang="en-US" dirty="0" smtClean="0"/>
-              <a:t>An appropriate document viewer (PDF viewer, web browser)</a:t>
-            </a:r>
-          </a:p>
-          <a:p>
-            <a:pPr lvl="1"/>
-            <a:r>
-              <a:rPr lang="en-US" dirty="0" err="1"/>
-              <a:t>p</a:t>
-            </a:r>
-            <a:r>
-              <a:rPr lang="en-US" dirty="0" err="1" smtClean="0"/>
-              <a:t>andoc</a:t>
-            </a:r>
-            <a:r>
-              <a:rPr lang="en-US" dirty="0" smtClean="0"/>
-              <a:t> (optional)</a:t>
-            </a:r>
-          </a:p>
-          <a:p>
-            <a:r>
-              <a:rPr lang="en-US" dirty="0" smtClean="0"/>
-              <a:t>Easiest to use </a:t>
-            </a:r>
-            <a:r>
-              <a:rPr lang="en-US" dirty="0" err="1" smtClean="0"/>
-              <a:t>RStudio</a:t>
-            </a:r>
-            <a:r>
-              <a:rPr lang="en-US" dirty="0" smtClean="0"/>
-              <a:t> where </a:t>
-            </a:r>
-            <a:r>
-              <a:rPr lang="en-US" dirty="0" err="1" smtClean="0"/>
-              <a:t>knitr</a:t>
-            </a:r>
-            <a:r>
-              <a:rPr lang="en-US" dirty="0" smtClean="0"/>
-              <a:t> (and </a:t>
-            </a:r>
-            <a:r>
-              <a:rPr lang="en-US" dirty="0" err="1" smtClean="0"/>
-              <a:t>Sweave</a:t>
-            </a:r>
-            <a:r>
-              <a:rPr lang="en-US" dirty="0" smtClean="0"/>
-              <a:t>) are already integrated</a:t>
-            </a:r>
+          <a:bodyPr/>
+          <a:lstStyle/>
+          <a:p>
+            <a:r>
+              <a:rPr lang="en-US" dirty="0" smtClean="0"/>
+              <a:t>Long research articles</a:t>
+            </a:r>
+          </a:p>
+          <a:p>
+            <a:r>
+              <a:rPr lang="en-US" dirty="0" smtClean="0"/>
+              <a:t>Complex time-consuming computations (i.e. long MCMC, optimizations)</a:t>
+            </a:r>
+          </a:p>
+          <a:p>
+            <a:r>
+              <a:rPr lang="en-US" dirty="0" smtClean="0"/>
+              <a:t>Documents that require precise formatting</a:t>
+            </a:r>
+          </a:p>
+          <a:p>
+            <a:r>
+              <a:rPr lang="en-US" dirty="0" smtClean="0"/>
+              <a:t>Books (although can be done with use of other tools)</a:t>
+            </a:r>
+          </a:p>
+          <a:p>
+            <a:pPr marL="0" indent="0">
+              <a:buNone/>
+            </a:pPr>
             <a:endParaRPr lang="en-US" dirty="0"/>
           </a:p>
         </p:txBody>
@@ -5088,7 +5082,7 @@
     </p:spTree>
     <p:extLst>
       <p:ext uri="{BB962C8B-B14F-4D97-AF65-F5344CB8AC3E}">
-        <p14:creationId xmlns:p14="http://schemas.microsoft.com/office/powerpoint/2010/main" val="3553516013"/>
+        <p14:creationId xmlns:p14="http://schemas.microsoft.com/office/powerpoint/2010/main" val="1200545130"/>
       </p:ext>
     </p:extLst>
   </p:cSld>
@@ -5117,7 +5111,7 @@
       </p:grpSpPr>
       <p:sp>
         <p:nvSpPr>
-          <p:cNvPr id="4" name="Title 3"/>
+          <p:cNvPr id="2" name="Title 1"/>
           <p:cNvSpPr>
             <a:spLocks noGrp="1"/>
           </p:cNvSpPr>
@@ -5130,6 +5124,10 @@
           <a:bodyPr/>
           <a:lstStyle/>
           <a:p>
+            <a:r>
+              <a:rPr lang="en-US" dirty="0" smtClean="0"/>
+              <a:t>Using </a:t>
+            </a:r>
             <a:r>
               <a:rPr lang="en-US" dirty="0" err="1" smtClean="0"/>
               <a:t>knitr</a:t>
@@ -5138,73 +5136,115 @@
           </a:p>
         </p:txBody>
       </p:sp>
-      <p:pic>
-        <p:nvPicPr>
-          <p:cNvPr id="5" name="Picture 4" descr="Screen Shot 2013-04-24 at 4.46.38 PM.png"/>
-          <p:cNvPicPr>
-            <a:picLocks noChangeAspect="1"/>
-          </p:cNvPicPr>
-          <p:nvPr/>
-        </p:nvPicPr>
-        <p:blipFill>
-          <a:blip r:embed="rId2">
-            <a:extLst>
-              <a:ext uri="{28A0092B-C50C-407E-A947-70E740481C1C}">
-                <a14:useLocalDpi xmlns:a14="http://schemas.microsoft.com/office/drawing/2010/main" val="0"/>
-              </a:ext>
-            </a:extLst>
-          </a:blip>
-          <a:stretch>
-            <a:fillRect/>
-          </a:stretch>
-        </p:blipFill>
-        <p:spPr>
-          <a:xfrm>
-            <a:off x="252369" y="1391572"/>
-            <a:ext cx="7913563" cy="4979846"/>
-          </a:xfrm>
-          <a:prstGeom prst="rect">
-            <a:avLst/>
-          </a:prstGeom>
-        </p:spPr>
-      </p:pic>
-      <p:sp>
-        <p:nvSpPr>
-          <p:cNvPr id="6" name="TextBox 5"/>
-          <p:cNvSpPr txBox="1"/>
-          <p:nvPr/>
-        </p:nvSpPr>
-        <p:spPr>
-          <a:xfrm>
-            <a:off x="6761805" y="6488668"/>
-            <a:ext cx="2382195" cy="369332"/>
-          </a:xfrm>
-          <a:prstGeom prst="rect">
-            <a:avLst/>
-          </a:prstGeom>
-          <a:noFill/>
-        </p:spPr>
-        <p:txBody>
-          <a:bodyPr wrap="none" rtlCol="0">
-            <a:spAutoFit/>
+      <p:sp>
+        <p:nvSpPr>
+          <p:cNvPr id="3" name="Content Placeholder 2"/>
+          <p:cNvSpPr>
+            <a:spLocks noGrp="1"/>
+          </p:cNvSpPr>
+          <p:nvPr>
+            <p:ph idx="1"/>
+          </p:nvPr>
+        </p:nvSpPr>
+        <p:spPr/>
+        <p:txBody>
+          <a:bodyPr>
+            <a:normAutofit fontScale="92500"/>
           </a:bodyPr>
           <a:lstStyle/>
           <a:p>
             <a:r>
-              <a:rPr lang="en-US" dirty="0" smtClean="0"/>
-              <a:t>http://</a:t>
-            </a:r>
-            <a:r>
               <a:rPr lang="en-US" dirty="0" err="1" smtClean="0"/>
-              <a:t>yihui.name</a:t>
-            </a:r>
-            <a:r>
-              <a:rPr lang="en-US" dirty="0" smtClean="0"/>
-              <a:t>/</a:t>
-            </a:r>
+              <a:t>Toolchain</a:t>
+            </a:r>
+            <a:endParaRPr lang="en-US" dirty="0" smtClean="0"/>
+          </a:p>
+          <a:p>
+            <a:pPr lvl="1"/>
+            <a:r>
+              <a:rPr lang="en-US" dirty="0" smtClean="0"/>
+              <a:t>Text editor</a:t>
+            </a:r>
+          </a:p>
+          <a:p>
+            <a:pPr lvl="1"/>
+            <a:r>
+              <a:rPr lang="en-US" dirty="0" smtClean="0"/>
+              <a:t>R</a:t>
+            </a:r>
+          </a:p>
+          <a:p>
+            <a:pPr lvl="1"/>
             <a:r>
               <a:rPr lang="en-US" dirty="0" err="1" smtClean="0"/>
               <a:t>knitr</a:t>
+            </a:r>
+            <a:r>
+              <a:rPr lang="en-US" dirty="0" smtClean="0"/>
+              <a:t> package (from CRAN via </a:t>
+            </a:r>
+            <a:r>
+              <a:rPr lang="en-US" dirty="0" err="1" smtClean="0">
+                <a:latin typeface="Courier"/>
+                <a:cs typeface="Courier"/>
+              </a:rPr>
+              <a:t>install.packages</a:t>
+            </a:r>
+            <a:r>
+              <a:rPr lang="en-US" dirty="0" smtClean="0"/>
+              <a:t>)</a:t>
+            </a:r>
+          </a:p>
+          <a:p>
+            <a:pPr lvl="1"/>
+            <a:r>
+              <a:rPr lang="en-US" dirty="0" smtClean="0"/>
+              <a:t>An appropriate document viewer (PDF viewer, web browser)</a:t>
+            </a:r>
+          </a:p>
+          <a:p>
+            <a:pPr lvl="1"/>
+            <a:r>
+              <a:rPr lang="en-US" dirty="0" err="1"/>
+              <a:t>p</a:t>
+            </a:r>
+            <a:r>
+              <a:rPr lang="en-US" dirty="0" err="1" smtClean="0"/>
+              <a:t>andoc</a:t>
+            </a:r>
+            <a:r>
+              <a:rPr lang="en-US" dirty="0" smtClean="0"/>
+              <a:t> (optional)</a:t>
+            </a:r>
+          </a:p>
+          <a:p>
+            <a:r>
+              <a:rPr lang="en-US" dirty="0" smtClean="0"/>
+              <a:t>Easiest to use </a:t>
+            </a:r>
+            <a:r>
+              <a:rPr lang="en-US" dirty="0" err="1" smtClean="0"/>
+              <a:t>RStudio</a:t>
+            </a:r>
+            <a:r>
+              <a:rPr lang="en-US" dirty="0" smtClean="0"/>
+              <a:t> where </a:t>
+            </a:r>
+            <a:r>
+              <a:rPr lang="en-US" dirty="0" err="1" smtClean="0"/>
+              <a:t>knitr</a:t>
+            </a:r>
+            <a:r>
+              <a:rPr lang="en-US" dirty="0" smtClean="0"/>
+              <a:t> (and </a:t>
+            </a:r>
+            <a:r>
+              <a:rPr lang="en-US" dirty="0" err="1" smtClean="0"/>
+              <a:t>Sweave</a:t>
+            </a:r>
+            <a:r>
+              <a:rPr lang="en-US" dirty="0" smtClean="0"/>
+              <a:t>) are already integrated</a:t>
             </a:r>
             <a:endParaRPr lang="en-US" dirty="0"/>
           </a:p>
@@ -5213,7 +5253,7 @@
     </p:spTree>
     <p:extLst>
       <p:ext uri="{BB962C8B-B14F-4D97-AF65-F5344CB8AC3E}">
-        <p14:creationId xmlns:p14="http://schemas.microsoft.com/office/powerpoint/2010/main" val="3146712758"/>
+        <p14:creationId xmlns:p14="http://schemas.microsoft.com/office/powerpoint/2010/main" val="3553516013"/>
       </p:ext>
     </p:extLst>
   </p:cSld>
@@ -5242,7 +5282,7 @@
       </p:grpSpPr>
       <p:sp>
         <p:nvSpPr>
-          <p:cNvPr id="2" name="Title 1"/>
+          <p:cNvPr id="4" name="Title 3"/>
           <p:cNvSpPr>
             <a:spLocks noGrp="1"/>
           </p:cNvSpPr>
@@ -5257,7 +5297,7 @@
           <a:p>
             <a:r>
               <a:rPr lang="en-US" dirty="0" err="1" smtClean="0"/>
-              <a:t>Pandoc</a:t>
+              <a:t>knitr</a:t>
             </a:r>
             <a:endParaRPr lang="en-US" dirty="0"/>
           </a:p>
@@ -5265,7 +5305,7 @@
       </p:sp>
       <p:pic>
         <p:nvPicPr>
-          <p:cNvPr id="3" name="Picture 2" descr="Screen Shot 2013-04-24 at 4.47.38 PM.png"/>
+          <p:cNvPr id="5" name="Picture 4" descr="Screen Shot 2013-04-24 at 4.46.38 PM.png"/>
           <p:cNvPicPr>
             <a:picLocks noChangeAspect="1"/>
           </p:cNvPicPr>
@@ -5285,8 +5325,8 @@
         </p:blipFill>
         <p:spPr>
           <a:xfrm>
-            <a:off x="0" y="1995892"/>
-            <a:ext cx="9144000" cy="3991428"/>
+            <a:off x="252369" y="1391572"/>
+            <a:ext cx="7913563" cy="4979846"/>
           </a:xfrm>
           <a:prstGeom prst="rect">
             <a:avLst/>
@@ -5295,14 +5335,14 @@
       </p:pic>
       <p:sp>
         <p:nvSpPr>
-          <p:cNvPr id="4" name="TextBox 3"/>
+          <p:cNvPr id="6" name="TextBox 5"/>
           <p:cNvSpPr txBox="1"/>
           <p:nvPr/>
         </p:nvSpPr>
         <p:spPr>
           <a:xfrm>
-            <a:off x="5626026" y="6485915"/>
-            <a:ext cx="3531736" cy="369332"/>
+            <a:off x="6761805" y="6488668"/>
+            <a:ext cx="2382195" cy="369332"/>
           </a:xfrm>
           <a:prstGeom prst="rect">
             <a:avLst/>
@@ -5321,7 +5361,7 @@
             </a:r>
             <a:r>
               <a:rPr lang="en-US" dirty="0" err="1" smtClean="0"/>
-              <a:t>johnmacfarlane.net</a:t>
+              <a:t>yihui.name</a:t>
             </a:r>
             <a:r>
               <a:rPr lang="en-US" dirty="0" smtClean="0"/>
@@ -5329,11 +5369,7 @@
             </a:r>
             <a:r>
               <a:rPr lang="en-US" dirty="0" err="1" smtClean="0"/>
-              <a:t>pandoc</a:t>
-            </a:r>
-            <a:r>
-              <a:rPr lang="en-US" dirty="0" smtClean="0"/>
-              <a:t>/</a:t>
+              <a:t>knitr</a:t>
             </a:r>
             <a:endParaRPr lang="en-US" dirty="0"/>
           </a:p>
@@ -5342,7 +5378,7 @@
     </p:spTree>
     <p:extLst>
       <p:ext uri="{BB962C8B-B14F-4D97-AF65-F5344CB8AC3E}">
-        <p14:creationId xmlns:p14="http://schemas.microsoft.com/office/powerpoint/2010/main" val="4026061528"/>
+        <p14:creationId xmlns:p14="http://schemas.microsoft.com/office/powerpoint/2010/main" val="3146712758"/>
       </p:ext>
     </p:extLst>
   </p:cSld>
@@ -5386,7 +5422,7 @@
           <a:p>
             <a:r>
               <a:rPr lang="en-US" dirty="0" err="1" smtClean="0"/>
-              <a:t>RStudio</a:t>
+              <a:t>Pandoc</a:t>
             </a:r>
             <a:endParaRPr lang="en-US" dirty="0"/>
           </a:p>
@@ -5394,7 +5430,7 @@
       </p:sp>
       <p:pic>
         <p:nvPicPr>
-          <p:cNvPr id="4" name="Picture 3" descr="Screen Shot 2013-04-24 at 4.44.20 PM.png"/>
+          <p:cNvPr id="3" name="Picture 2" descr="Screen Shot 2013-04-24 at 4.47.38 PM.png"/>
           <p:cNvPicPr>
             <a:picLocks noChangeAspect="1"/>
           </p:cNvPicPr>
@@ -5414,8 +5450,8 @@
         </p:blipFill>
         <p:spPr>
           <a:xfrm>
-            <a:off x="238717" y="1363019"/>
-            <a:ext cx="7886248" cy="4956420"/>
+            <a:off x="0" y="1995892"/>
+            <a:ext cx="9144000" cy="3991428"/>
           </a:xfrm>
           <a:prstGeom prst="rect">
             <a:avLst/>
@@ -5424,14 +5460,14 @@
       </p:pic>
       <p:sp>
         <p:nvSpPr>
-          <p:cNvPr id="5" name="TextBox 4"/>
+          <p:cNvPr id="4" name="TextBox 3"/>
           <p:cNvSpPr txBox="1"/>
           <p:nvPr/>
         </p:nvSpPr>
         <p:spPr>
           <a:xfrm>
-            <a:off x="6649657" y="6472259"/>
-            <a:ext cx="2494343" cy="369332"/>
+            <a:off x="5626026" y="6485915"/>
+            <a:ext cx="3531736" cy="369332"/>
           </a:xfrm>
           <a:prstGeom prst="rect">
             <a:avLst/>
@@ -5450,7 +5486,19 @@
             </a:r>
             <a:r>
               <a:rPr lang="en-US" dirty="0" err="1" smtClean="0"/>
-              <a:t>www.rstudio.com</a:t>
+              <a:t>johnmacfarlane.net</a:t>
+            </a:r>
+            <a:r>
+              <a:rPr lang="en-US" dirty="0" smtClean="0"/>
+              <a:t>/</a:t>
+            </a:r>
+            <a:r>
+              <a:rPr lang="en-US" dirty="0" err="1" smtClean="0"/>
+              <a:t>pandoc</a:t>
+            </a:r>
+            <a:r>
+              <a:rPr lang="en-US" dirty="0" smtClean="0"/>
+              <a:t>/</a:t>
             </a:r>
             <a:endParaRPr lang="en-US" dirty="0"/>
           </a:p>
@@ -5459,7 +5507,7 @@
     </p:spTree>
     <p:extLst>
       <p:ext uri="{BB962C8B-B14F-4D97-AF65-F5344CB8AC3E}">
-        <p14:creationId xmlns:p14="http://schemas.microsoft.com/office/powerpoint/2010/main" val="1906510338"/>
+        <p14:creationId xmlns:p14="http://schemas.microsoft.com/office/powerpoint/2010/main" val="4026061528"/>
       </p:ext>
     </p:extLst>
   </p:cSld>
@@ -5502,8 +5550,8 @@
           <a:lstStyle/>
           <a:p>
             <a:r>
-              <a:rPr lang="en-US" dirty="0" smtClean="0"/>
-              <a:t>Markdown</a:t>
+              <a:rPr lang="en-US" dirty="0" err="1" smtClean="0"/>
+              <a:t>RStudio</a:t>
             </a:r>
             <a:endParaRPr lang="en-US" dirty="0"/>
           </a:p>
@@ -5511,7 +5559,7 @@
       </p:sp>
       <p:pic>
         <p:nvPicPr>
-          <p:cNvPr id="3" name="Picture 2" descr="Screen Shot 2013-04-24 at 4.46.10 PM.png"/>
+          <p:cNvPr id="4" name="Picture 3" descr="Screen Shot 2013-04-24 at 4.44.20 PM.png"/>
           <p:cNvPicPr>
             <a:picLocks noChangeAspect="1"/>
           </p:cNvPicPr>
@@ -5531,8 +5579,8 @@
         </p:blipFill>
         <p:spPr>
           <a:xfrm>
-            <a:off x="1283608" y="1417639"/>
-            <a:ext cx="6955044" cy="4938620"/>
+            <a:off x="238717" y="1363019"/>
+            <a:ext cx="7886248" cy="4956420"/>
           </a:xfrm>
           <a:prstGeom prst="rect">
             <a:avLst/>
@@ -5541,14 +5589,14 @@
       </p:pic>
       <p:sp>
         <p:nvSpPr>
-          <p:cNvPr id="4" name="TextBox 3"/>
+          <p:cNvPr id="5" name="TextBox 4"/>
           <p:cNvSpPr txBox="1"/>
           <p:nvPr/>
         </p:nvSpPr>
         <p:spPr>
           <a:xfrm>
-            <a:off x="4672140" y="6458604"/>
-            <a:ext cx="4471860" cy="369332"/>
+            <a:off x="6649657" y="6472259"/>
+            <a:ext cx="2494343" cy="369332"/>
           </a:xfrm>
           <a:prstGeom prst="rect">
             <a:avLst/>
@@ -5567,11 +5615,7 @@
             </a:r>
             <a:r>
               <a:rPr lang="en-US" dirty="0" err="1" smtClean="0"/>
-              <a:t>daringfireball.net</a:t>
-            </a:r>
-            <a:r>
-              <a:rPr lang="en-US" dirty="0" smtClean="0"/>
-              <a:t>/projects/markdown/</a:t>
+              <a:t>www.rstudio.com</a:t>
             </a:r>
             <a:endParaRPr lang="en-US" dirty="0"/>
           </a:p>
@@ -5580,7 +5624,7 @@
     </p:spTree>
     <p:extLst>
       <p:ext uri="{BB962C8B-B14F-4D97-AF65-F5344CB8AC3E}">
-        <p14:creationId xmlns:p14="http://schemas.microsoft.com/office/powerpoint/2010/main" val="1988428228"/>
+        <p14:creationId xmlns:p14="http://schemas.microsoft.com/office/powerpoint/2010/main" val="1906510338"/>
       </p:ext>
     </p:extLst>
   </p:cSld>
@@ -5630,50 +5674,69 @@
           </a:p>
         </p:txBody>
       </p:sp>
-      <p:sp>
-        <p:nvSpPr>
-          <p:cNvPr id="3" name="Content Placeholder 2"/>
-          <p:cNvSpPr>
-            <a:spLocks noGrp="1"/>
-          </p:cNvSpPr>
-          <p:nvPr>
-            <p:ph idx="1"/>
-          </p:nvPr>
-        </p:nvSpPr>
-        <p:spPr/>
-        <p:txBody>
-          <a:bodyPr/>
-          <a:lstStyle/>
-          <a:p>
-            <a:r>
-              <a:rPr lang="en-US" dirty="0" smtClean="0"/>
-              <a:t>A simpler version of “markup” languages</a:t>
-            </a:r>
-          </a:p>
-          <a:p>
-            <a:r>
-              <a:rPr lang="en-US" dirty="0" smtClean="0"/>
-              <a:t>Written in simple text format</a:t>
-            </a:r>
-          </a:p>
-          <a:p>
-            <a:r>
-              <a:rPr lang="en-US" dirty="0" smtClean="0"/>
-              <a:t>Has minimal formatting indicators</a:t>
-            </a:r>
-          </a:p>
-          <a:p>
-            <a:r>
-              <a:rPr lang="en-US" dirty="0" smtClean="0"/>
-              <a:t>Many tools support converting it to other formats (</a:t>
+      <p:pic>
+        <p:nvPicPr>
+          <p:cNvPr id="3" name="Picture 2" descr="Screen Shot 2013-04-24 at 4.46.10 PM.png"/>
+          <p:cNvPicPr>
+            <a:picLocks noChangeAspect="1"/>
+          </p:cNvPicPr>
+          <p:nvPr/>
+        </p:nvPicPr>
+        <p:blipFill>
+          <a:blip r:embed="rId2">
+            <a:extLst>
+              <a:ext uri="{28A0092B-C50C-407E-A947-70E740481C1C}">
+                <a14:useLocalDpi xmlns:a14="http://schemas.microsoft.com/office/drawing/2010/main" val="0"/>
+              </a:ext>
+            </a:extLst>
+          </a:blip>
+          <a:stretch>
+            <a:fillRect/>
+          </a:stretch>
+        </p:blipFill>
+        <p:spPr>
+          <a:xfrm>
+            <a:off x="1283608" y="1417639"/>
+            <a:ext cx="6955044" cy="4938620"/>
+          </a:xfrm>
+          <a:prstGeom prst="rect">
+            <a:avLst/>
+          </a:prstGeom>
+        </p:spPr>
+      </p:pic>
+      <p:sp>
+        <p:nvSpPr>
+          <p:cNvPr id="4" name="TextBox 3"/>
+          <p:cNvSpPr txBox="1"/>
+          <p:nvPr/>
+        </p:nvSpPr>
+        <p:spPr>
+          <a:xfrm>
+            <a:off x="4672140" y="6458604"/>
+            <a:ext cx="4471860" cy="369332"/>
+          </a:xfrm>
+          <a:prstGeom prst="rect">
+            <a:avLst/>
+          </a:prstGeom>
+          <a:noFill/>
+        </p:spPr>
+        <p:txBody>
+          <a:bodyPr wrap="none" rtlCol="0">
+            <a:spAutoFit/>
+          </a:bodyPr>
+          <a:lstStyle/>
+          <a:p>
+            <a:r>
+              <a:rPr lang="en-US" dirty="0" smtClean="0"/>
+              <a:t>http://</a:t>
             </a:r>
             <a:r>
               <a:rPr lang="en-US" dirty="0" err="1" smtClean="0"/>
-              <a:t>pandoc</a:t>
-            </a:r>
-            <a:r>
-              <a:rPr lang="en-US" dirty="0" smtClean="0"/>
-              <a:t>)</a:t>
+              <a:t>daringfireball.net</a:t>
+            </a:r>
+            <a:r>
+              <a:rPr lang="en-US" dirty="0" smtClean="0"/>
+              <a:t>/projects/markdown/</a:t>
             </a:r>
             <a:endParaRPr lang="en-US" dirty="0"/>
           </a:p>
@@ -5682,7 +5745,7 @@
     </p:spTree>
     <p:extLst>
       <p:ext uri="{BB962C8B-B14F-4D97-AF65-F5344CB8AC3E}">
-        <p14:creationId xmlns:p14="http://schemas.microsoft.com/office/powerpoint/2010/main" val="226514928"/>
+        <p14:creationId xmlns:p14="http://schemas.microsoft.com/office/powerpoint/2010/main" val="1988428228"/>
       </p:ext>
     </p:extLst>
   </p:cSld>
@@ -5749,6 +5812,124 @@
           <a:p>
             <a:r>
               <a:rPr lang="en-US" dirty="0" smtClean="0"/>
+              <a:t>A simpler version of “markup” languages</a:t>
+            </a:r>
+          </a:p>
+          <a:p>
+            <a:r>
+              <a:rPr lang="en-US" dirty="0" smtClean="0"/>
+              <a:t>Written in simple text format</a:t>
+            </a:r>
+          </a:p>
+          <a:p>
+            <a:r>
+              <a:rPr lang="en-US" dirty="0" smtClean="0"/>
+              <a:t>Has minimal formatting indicators</a:t>
+            </a:r>
+          </a:p>
+          <a:p>
+            <a:r>
+              <a:rPr lang="en-US" dirty="0"/>
+              <a:t>T</a:t>
+            </a:r>
+            <a:r>
+              <a:rPr lang="en-US" dirty="0" smtClean="0"/>
+              <a:t>ools </a:t>
+            </a:r>
+            <a:r>
+              <a:rPr lang="en-US" dirty="0" smtClean="0"/>
+              <a:t>support converting it to </a:t>
+            </a:r>
+            <a:r>
+              <a:rPr lang="en-US" dirty="0" smtClean="0"/>
+              <a:t>many other </a:t>
+            </a:r>
+            <a:r>
+              <a:rPr lang="en-US" dirty="0" smtClean="0"/>
+              <a:t>formats (</a:t>
+            </a:r>
+            <a:r>
+              <a:rPr lang="en-US" dirty="0" err="1" smtClean="0"/>
+              <a:t>pandoc</a:t>
+            </a:r>
+            <a:r>
+              <a:rPr lang="en-US" dirty="0" smtClean="0"/>
+              <a:t>)</a:t>
+            </a:r>
+            <a:endParaRPr lang="en-US" dirty="0"/>
+          </a:p>
+        </p:txBody>
+      </p:sp>
+    </p:spTree>
+    <p:extLst>
+      <p:ext uri="{BB962C8B-B14F-4D97-AF65-F5344CB8AC3E}">
+        <p14:creationId xmlns:p14="http://schemas.microsoft.com/office/powerpoint/2010/main" val="226514928"/>
+      </p:ext>
+    </p:extLst>
+  </p:cSld>
+  <p:clrMapOvr>
+    <a:masterClrMapping/>
+  </p:clrMapOvr>
+</p:sld>
+</file>
+
+<file path=ppt/slides/slide28.xml><?xml version="1.0" encoding="utf-8"?>
+<p:sld xmlns:a="http://schemas.openxmlformats.org/drawingml/2006/main" xmlns:r="http://schemas.openxmlformats.org/officeDocument/2006/relationships" xmlns:p="http://schemas.openxmlformats.org/presentationml/2006/main">
+  <p:cSld>
+    <p:spTree>
+      <p:nvGrpSpPr>
+        <p:cNvPr id="1" name=""/>
+        <p:cNvGrpSpPr/>
+        <p:nvPr/>
+      </p:nvGrpSpPr>
+      <p:grpSpPr>
+        <a:xfrm>
+          <a:off x="0" y="0"/>
+          <a:ext cx="0" cy="0"/>
+          <a:chOff x="0" y="0"/>
+          <a:chExt cx="0" cy="0"/>
+        </a:xfrm>
+      </p:grpSpPr>
+      <p:sp>
+        <p:nvSpPr>
+          <p:cNvPr id="2" name="Title 1"/>
+          <p:cNvSpPr>
+            <a:spLocks noGrp="1"/>
+          </p:cNvSpPr>
+          <p:nvPr>
+            <p:ph type="title"/>
+          </p:nvPr>
+        </p:nvSpPr>
+        <p:spPr/>
+        <p:txBody>
+          <a:bodyPr/>
+          <a:lstStyle/>
+          <a:p>
+            <a:r>
+              <a:rPr lang="en-US" dirty="0" smtClean="0"/>
+              <a:t>Markdown</a:t>
+            </a:r>
+            <a:endParaRPr lang="en-US" dirty="0"/>
+          </a:p>
+        </p:txBody>
+      </p:sp>
+      <p:sp>
+        <p:nvSpPr>
+          <p:cNvPr id="3" name="Content Placeholder 2"/>
+          <p:cNvSpPr>
+            <a:spLocks noGrp="1"/>
+          </p:cNvSpPr>
+          <p:nvPr>
+            <p:ph idx="1"/>
+          </p:nvPr>
+        </p:nvSpPr>
+        <p:spPr/>
+        <p:txBody>
+          <a:bodyPr/>
+          <a:lstStyle/>
+          <a:p>
+            <a:r>
+              <a:rPr lang="en-US" dirty="0" smtClean="0"/>
               <a:t># indicates a first-level header</a:t>
             </a:r>
           </a:p>
@@ -5809,7 +5990,7 @@
 </p:sld>
 </file>
 
-<file path=ppt/slides/slide28.xml><?xml version="1.0" encoding="utf-8"?>
+<file path=ppt/slides/slide29.xml><?xml version="1.0" encoding="utf-8"?>
 <p:sld xmlns:a="http://schemas.openxmlformats.org/drawingml/2006/main" xmlns:r="http://schemas.openxmlformats.org/officeDocument/2006/relationships" xmlns:p="http://schemas.openxmlformats.org/presentationml/2006/main">
   <p:cSld>
     <p:spTree>
@@ -5899,7 +6080,112 @@
 </p:sld>
 </file>
 
-<file path=ppt/slides/slide29.xml><?xml version="1.0" encoding="utf-8"?>
+<file path=ppt/slides/slide3.xml><?xml version="1.0" encoding="utf-8"?>
+<p:sld xmlns:a="http://schemas.openxmlformats.org/drawingml/2006/main" xmlns:r="http://schemas.openxmlformats.org/officeDocument/2006/relationships" xmlns:p="http://schemas.openxmlformats.org/presentationml/2006/main">
+  <p:cSld>
+    <p:spTree>
+      <p:nvGrpSpPr>
+        <p:cNvPr id="1" name=""/>
+        <p:cNvGrpSpPr/>
+        <p:nvPr/>
+      </p:nvGrpSpPr>
+      <p:grpSpPr>
+        <a:xfrm>
+          <a:off x="0" y="0"/>
+          <a:ext cx="0" cy="0"/>
+          <a:chOff x="0" y="0"/>
+          <a:chExt cx="0" cy="0"/>
+        </a:xfrm>
+      </p:grpSpPr>
+      <p:sp>
+        <p:nvSpPr>
+          <p:cNvPr id="2" name="Title 1"/>
+          <p:cNvSpPr>
+            <a:spLocks noGrp="1"/>
+          </p:cNvSpPr>
+          <p:nvPr>
+            <p:ph type="title"/>
+          </p:nvPr>
+        </p:nvSpPr>
+        <p:spPr/>
+        <p:txBody>
+          <a:bodyPr>
+            <a:normAutofit/>
+          </a:bodyPr>
+          <a:lstStyle/>
+          <a:p>
+            <a:r>
+              <a:rPr lang="en-US" dirty="0" smtClean="0"/>
+              <a:t>What’s Wrong with Replication?</a:t>
+            </a:r>
+          </a:p>
+        </p:txBody>
+      </p:sp>
+      <p:sp>
+        <p:nvSpPr>
+          <p:cNvPr id="3" name="Content Placeholder 2"/>
+          <p:cNvSpPr>
+            <a:spLocks noGrp="1"/>
+          </p:cNvSpPr>
+          <p:nvPr>
+            <p:ph idx="1"/>
+          </p:nvPr>
+        </p:nvSpPr>
+        <p:spPr/>
+        <p:txBody>
+          <a:bodyPr>
+            <a:normAutofit/>
+          </a:bodyPr>
+          <a:lstStyle/>
+          <a:p>
+            <a:r>
+              <a:rPr lang="en-US" dirty="0" smtClean="0"/>
+              <a:t>Some studies cannot be replicated</a:t>
+            </a:r>
+          </a:p>
+          <a:p>
+            <a:pPr lvl="1"/>
+            <a:r>
+              <a:rPr lang="en-US" dirty="0" smtClean="0"/>
+              <a:t>No time, opportunistic</a:t>
+            </a:r>
+          </a:p>
+          <a:p>
+            <a:pPr lvl="1"/>
+            <a:r>
+              <a:rPr lang="en-US" dirty="0" smtClean="0"/>
+              <a:t>No money</a:t>
+            </a:r>
+          </a:p>
+          <a:p>
+            <a:pPr lvl="1"/>
+            <a:r>
+              <a:rPr lang="en-US" dirty="0" smtClean="0"/>
+              <a:t>Unique</a:t>
+            </a:r>
+          </a:p>
+          <a:p>
+            <a:r>
+              <a:rPr lang="en-US" dirty="0" smtClean="0"/>
+              <a:t>Reproducible Research: Make analytic data and code available so that others may reproduce findings</a:t>
+            </a:r>
+          </a:p>
+        </p:txBody>
+      </p:sp>
+    </p:spTree>
+    <p:extLst>
+      <p:ext uri="{BB962C8B-B14F-4D97-AF65-F5344CB8AC3E}">
+        <p14:creationId xmlns:p14="http://schemas.microsoft.com/office/powerpoint/2010/main" val="2901057721"/>
+      </p:ext>
+    </p:extLst>
+  </p:cSld>
+  <p:clrMapOvr>
+    <a:masterClrMapping/>
+  </p:clrMapOvr>
+</p:sld>
+</file>
+
+<file path=ppt/slides/slide30.xml><?xml version="1.0" encoding="utf-8"?>
 <p:sld xmlns:a="http://schemas.openxmlformats.org/drawingml/2006/main" xmlns:r="http://schemas.openxmlformats.org/officeDocument/2006/relationships" xmlns:p="http://schemas.openxmlformats.org/presentationml/2006/main">
   <p:cSld>
     <p:spTree>
@@ -6108,112 +6394,7 @@
 </p:sld>
 </file>
 
-<file path=ppt/slides/slide3.xml><?xml version="1.0" encoding="utf-8"?>
-<p:sld xmlns:a="http://schemas.openxmlformats.org/drawingml/2006/main" xmlns:r="http://schemas.openxmlformats.org/officeDocument/2006/relationships" xmlns:p="http://schemas.openxmlformats.org/presentationml/2006/main">
-  <p:cSld>
-    <p:spTree>
-      <p:nvGrpSpPr>
-        <p:cNvPr id="1" name=""/>
-        <p:cNvGrpSpPr/>
-        <p:nvPr/>
-      </p:nvGrpSpPr>
-      <p:grpSpPr>
-        <a:xfrm>
-          <a:off x="0" y="0"/>
-          <a:ext cx="0" cy="0"/>
-          <a:chOff x="0" y="0"/>
-          <a:chExt cx="0" cy="0"/>
-        </a:xfrm>
-      </p:grpSpPr>
-      <p:sp>
-        <p:nvSpPr>
-          <p:cNvPr id="2" name="Title 1"/>
-          <p:cNvSpPr>
-            <a:spLocks noGrp="1"/>
-          </p:cNvSpPr>
-          <p:nvPr>
-            <p:ph type="title"/>
-          </p:nvPr>
-        </p:nvSpPr>
-        <p:spPr/>
-        <p:txBody>
-          <a:bodyPr>
-            <a:normAutofit/>
-          </a:bodyPr>
-          <a:lstStyle/>
-          <a:p>
-            <a:r>
-              <a:rPr lang="en-US" dirty="0" smtClean="0"/>
-              <a:t>What’s Wrong with Replication?</a:t>
-            </a:r>
-          </a:p>
-        </p:txBody>
-      </p:sp>
-      <p:sp>
-        <p:nvSpPr>
-          <p:cNvPr id="3" name="Content Placeholder 2"/>
-          <p:cNvSpPr>
-            <a:spLocks noGrp="1"/>
-          </p:cNvSpPr>
-          <p:nvPr>
-            <p:ph idx="1"/>
-          </p:nvPr>
-        </p:nvSpPr>
-        <p:spPr/>
-        <p:txBody>
-          <a:bodyPr>
-            <a:normAutofit/>
-          </a:bodyPr>
-          <a:lstStyle/>
-          <a:p>
-            <a:r>
-              <a:rPr lang="en-US" dirty="0" smtClean="0"/>
-              <a:t>Some studies cannot be replicated</a:t>
-            </a:r>
-          </a:p>
-          <a:p>
-            <a:pPr lvl="1"/>
-            <a:r>
-              <a:rPr lang="en-US" dirty="0" smtClean="0"/>
-              <a:t>No time, opportunistic</a:t>
-            </a:r>
-          </a:p>
-          <a:p>
-            <a:pPr lvl="1"/>
-            <a:r>
-              <a:rPr lang="en-US" dirty="0" smtClean="0"/>
-              <a:t>No money</a:t>
-            </a:r>
-          </a:p>
-          <a:p>
-            <a:pPr lvl="1"/>
-            <a:r>
-              <a:rPr lang="en-US" dirty="0" smtClean="0"/>
-              <a:t>Unique</a:t>
-            </a:r>
-          </a:p>
-          <a:p>
-            <a:r>
-              <a:rPr lang="en-US" dirty="0" smtClean="0"/>
-              <a:t>Reproducible Research: Make analytic data and code available so that others may reproduce findings</a:t>
-            </a:r>
-          </a:p>
-        </p:txBody>
-      </p:sp>
-    </p:spTree>
-    <p:extLst>
-      <p:ext uri="{BB962C8B-B14F-4D97-AF65-F5344CB8AC3E}">
-        <p14:creationId xmlns:p14="http://schemas.microsoft.com/office/powerpoint/2010/main" val="2901057721"/>
-      </p:ext>
-    </p:extLst>
-  </p:cSld>
-  <p:clrMapOvr>
-    <a:masterClrMapping/>
-  </p:clrMapOvr>
-</p:sld>
-</file>
-
-<file path=ppt/slides/slide30.xml><?xml version="1.0" encoding="utf-8"?>
+<file path=ppt/slides/slide31.xml><?xml version="1.0" encoding="utf-8"?>
 <p:sld xmlns:a="http://schemas.openxmlformats.org/drawingml/2006/main" xmlns:r="http://schemas.openxmlformats.org/officeDocument/2006/relationships" xmlns:p="http://schemas.openxmlformats.org/presentationml/2006/main">
   <p:cSld>
     <p:spTree>
@@ -6287,96 +6468,6 @@
     <p:extLst>
       <p:ext uri="{BB962C8B-B14F-4D97-AF65-F5344CB8AC3E}">
         <p14:creationId xmlns:p14="http://schemas.microsoft.com/office/powerpoint/2010/main" val="1275279394"/>
-      </p:ext>
-    </p:extLst>
-  </p:cSld>
-  <p:clrMapOvr>
-    <a:masterClrMapping/>
-  </p:clrMapOvr>
-  <p:timing>
-    <p:tnLst>
-      <p:par>
-        <p:cTn xmlns:p14="http://schemas.microsoft.com/office/powerpoint/2010/main" id="1" dur="indefinite" restart="never" nodeType="tmRoot"/>
-      </p:par>
-    </p:tnLst>
-  </p:timing>
-</p:sld>
-</file>
-
-<file path=ppt/slides/slide31.xml><?xml version="1.0" encoding="utf-8"?>
-<p:sld xmlns:a="http://schemas.openxmlformats.org/drawingml/2006/main" xmlns:r="http://schemas.openxmlformats.org/officeDocument/2006/relationships" xmlns:p="http://schemas.openxmlformats.org/presentationml/2006/main">
-  <p:cSld>
-    <p:spTree>
-      <p:nvGrpSpPr>
-        <p:cNvPr id="1" name=""/>
-        <p:cNvGrpSpPr/>
-        <p:nvPr/>
-      </p:nvGrpSpPr>
-      <p:grpSpPr>
-        <a:xfrm>
-          <a:off x="0" y="0"/>
-          <a:ext cx="0" cy="0"/>
-          <a:chOff x="0" y="0"/>
-          <a:chExt cx="0" cy="0"/>
-        </a:xfrm>
-      </p:grpSpPr>
-      <p:sp>
-        <p:nvSpPr>
-          <p:cNvPr id="2" name="Title 1"/>
-          <p:cNvSpPr>
-            <a:spLocks noGrp="1"/>
-          </p:cNvSpPr>
-          <p:nvPr>
-            <p:ph type="title"/>
-          </p:nvPr>
-        </p:nvSpPr>
-        <p:spPr/>
-        <p:txBody>
-          <a:bodyPr/>
-          <a:lstStyle/>
-          <a:p>
-            <a:r>
-              <a:rPr lang="en-US" dirty="0" smtClean="0"/>
-              <a:t>Under the Hood</a:t>
-            </a:r>
-            <a:endParaRPr lang="en-US" dirty="0"/>
-          </a:p>
-        </p:txBody>
-      </p:sp>
-      <p:pic>
-        <p:nvPicPr>
-          <p:cNvPr id="4" name="Picture 3" descr="Screen Shot 2013-04-24 at 5.40.30 PM.png"/>
-          <p:cNvPicPr>
-            <a:picLocks noChangeAspect="1"/>
-          </p:cNvPicPr>
-          <p:nvPr/>
-        </p:nvPicPr>
-        <p:blipFill>
-          <a:blip r:embed="rId2">
-            <a:extLst>
-              <a:ext uri="{28A0092B-C50C-407E-A947-70E740481C1C}">
-                <a14:useLocalDpi xmlns:a14="http://schemas.microsoft.com/office/drawing/2010/main" val="0"/>
-              </a:ext>
-            </a:extLst>
-          </a:blip>
-          <a:stretch>
-            <a:fillRect/>
-          </a:stretch>
-        </p:blipFill>
-        <p:spPr>
-          <a:xfrm>
-            <a:off x="1474781" y="1596463"/>
-            <a:ext cx="6314924" cy="5214813"/>
-          </a:xfrm>
-          <a:prstGeom prst="rect">
-            <a:avLst/>
-          </a:prstGeom>
-        </p:spPr>
-      </p:pic>
-    </p:spTree>
-    <p:extLst>
-      <p:ext uri="{BB962C8B-B14F-4D97-AF65-F5344CB8AC3E}">
-        <p14:creationId xmlns:p14="http://schemas.microsoft.com/office/powerpoint/2010/main" val="2179773101"/>
       </p:ext>
     </p:extLst>
   </p:cSld>
@@ -6427,84 +6518,59 @@
           <a:p>
             <a:r>
               <a:rPr lang="en-US" dirty="0" smtClean="0"/>
-              <a:t>A Few Notes</a:t>
+              <a:t>Under the Hood</a:t>
             </a:r>
             <a:endParaRPr lang="en-US" dirty="0"/>
           </a:p>
         </p:txBody>
       </p:sp>
-      <p:sp>
-        <p:nvSpPr>
-          <p:cNvPr id="3" name="Content Placeholder 2"/>
-          <p:cNvSpPr>
-            <a:spLocks noGrp="1"/>
-          </p:cNvSpPr>
-          <p:nvPr>
-            <p:ph idx="1"/>
-          </p:nvPr>
-        </p:nvSpPr>
-        <p:spPr/>
-        <p:txBody>
-          <a:bodyPr/>
-          <a:lstStyle/>
-          <a:p>
-            <a:r>
-              <a:rPr lang="en-US" dirty="0" smtClean="0"/>
-              <a:t>Code chunks begin with ```{r} on a line by itself and end with ``` on a line by itself</a:t>
-            </a:r>
-          </a:p>
-          <a:p>
-            <a:pPr lvl="1"/>
-            <a:r>
-              <a:rPr lang="en-US" dirty="0" smtClean="0"/>
-              <a:t>All R code goes in between</a:t>
-            </a:r>
-          </a:p>
-          <a:p>
-            <a:r>
-              <a:rPr lang="en-US" dirty="0" smtClean="0"/>
-              <a:t>Code chunks can have </a:t>
-            </a:r>
-            <a:r>
-              <a:rPr lang="en-US" dirty="0" smtClean="0"/>
-              <a:t>names, which is useful when making plots</a:t>
-            </a:r>
-            <a:endParaRPr lang="en-US" dirty="0" smtClean="0"/>
-          </a:p>
-          <a:p>
-            <a:r>
-              <a:rPr lang="en-US" dirty="0" smtClean="0"/>
-              <a:t>By default, code in a code chunk will be </a:t>
-            </a:r>
-            <a:r>
-              <a:rPr lang="en-US" b="1" dirty="0" smtClean="0"/>
-              <a:t>echoed</a:t>
-            </a:r>
-            <a:r>
-              <a:rPr lang="en-US" dirty="0" smtClean="0"/>
-              <a:t>, as will the </a:t>
-            </a:r>
-            <a:r>
-              <a:rPr lang="en-US" b="1" dirty="0" smtClean="0"/>
-              <a:t>result</a:t>
-            </a:r>
-            <a:r>
-              <a:rPr lang="en-US" dirty="0" smtClean="0"/>
-              <a:t> of the computation (if there is anything to print)</a:t>
-            </a:r>
-          </a:p>
-        </p:txBody>
-      </p:sp>
+      <p:pic>
+        <p:nvPicPr>
+          <p:cNvPr id="4" name="Picture 3" descr="Screen Shot 2013-04-24 at 5.40.30 PM.png"/>
+          <p:cNvPicPr>
+            <a:picLocks noChangeAspect="1"/>
+          </p:cNvPicPr>
+          <p:nvPr/>
+        </p:nvPicPr>
+        <p:blipFill>
+          <a:blip r:embed="rId2">
+            <a:extLst>
+              <a:ext uri="{28A0092B-C50C-407E-A947-70E740481C1C}">
+                <a14:useLocalDpi xmlns:a14="http://schemas.microsoft.com/office/drawing/2010/main" val="0"/>
+              </a:ext>
+            </a:extLst>
+          </a:blip>
+          <a:stretch>
+            <a:fillRect/>
+          </a:stretch>
+        </p:blipFill>
+        <p:spPr>
+          <a:xfrm>
+            <a:off x="1474781" y="1596463"/>
+            <a:ext cx="6314924" cy="5214813"/>
+          </a:xfrm>
+          <a:prstGeom prst="rect">
+            <a:avLst/>
+          </a:prstGeom>
+        </p:spPr>
+      </p:pic>
     </p:spTree>
     <p:extLst>
       <p:ext uri="{BB962C8B-B14F-4D97-AF65-F5344CB8AC3E}">
-        <p14:creationId xmlns:p14="http://schemas.microsoft.com/office/powerpoint/2010/main" val="3519303665"/>
+        <p14:creationId xmlns:p14="http://schemas.microsoft.com/office/powerpoint/2010/main" val="2179773101"/>
       </p:ext>
     </p:extLst>
   </p:cSld>
   <p:clrMapOvr>
     <a:masterClrMapping/>
   </p:clrMapOvr>
+  <p:timing>
+    <p:tnLst>
+      <p:par>
+        <p:cTn xmlns:p14="http://schemas.microsoft.com/office/powerpoint/2010/main" id="1" dur="indefinite" restart="never" nodeType="tmRoot"/>
+      </p:par>
+    </p:tnLst>
+  </p:timing>
 </p:sld>
 </file>
 
@@ -6537,14 +6603,12 @@
         </p:nvSpPr>
         <p:spPr/>
         <p:txBody>
-          <a:bodyPr>
-            <a:normAutofit fontScale="90000"/>
-          </a:bodyPr>
-          <a:lstStyle/>
-          <a:p>
-            <a:r>
-              <a:rPr lang="en-US" dirty="0" smtClean="0"/>
-              <a:t>Processing R Markdown Documents</a:t>
+          <a:bodyPr/>
+          <a:lstStyle/>
+          <a:p>
+            <a:r>
+              <a:rPr lang="en-US" dirty="0" smtClean="0"/>
+              <a:t>A Few Notes</a:t>
             </a:r>
             <a:endParaRPr lang="en-US" dirty="0"/>
           </a:p>
@@ -6567,56 +6631,42 @@
           <a:p>
             <a:r>
               <a:rPr lang="en-US" dirty="0" smtClean="0"/>
-              <a:t>The order is</a:t>
+              <a:t>Code chunks begin with ```{r} on a line by itself and end with ``` on a line by itself</a:t>
             </a:r>
           </a:p>
           <a:p>
             <a:pPr lvl="1"/>
             <a:r>
-              <a:rPr lang="en-US" dirty="0" err="1" smtClean="0"/>
-              <a:t>First.Rmd</a:t>
-            </a:r>
-            <a:endParaRPr lang="en-US" dirty="0" smtClean="0"/>
-          </a:p>
-          <a:p>
-            <a:pPr lvl="1"/>
-            <a:r>
-              <a:rPr lang="en-US" dirty="0" err="1" smtClean="0"/>
-              <a:t>First.md</a:t>
-            </a:r>
-            <a:endParaRPr lang="en-US" dirty="0" smtClean="0"/>
-          </a:p>
-          <a:p>
-            <a:pPr lvl="1"/>
-            <a:r>
-              <a:rPr lang="en-US" dirty="0" err="1" smtClean="0"/>
-              <a:t>First.html</a:t>
-            </a:r>
-            <a:endParaRPr lang="en-US" dirty="0" smtClean="0"/>
-          </a:p>
-          <a:p>
-            <a:r>
-              <a:rPr lang="en-US" dirty="0" smtClean="0"/>
-              <a:t>The .md file (and the .html file) are not things we care about and </a:t>
+              <a:rPr lang="en-US" dirty="0" smtClean="0"/>
+              <a:t>All R code goes in between</a:t>
+            </a:r>
+          </a:p>
+          <a:p>
+            <a:r>
+              <a:rPr lang="en-US" dirty="0" smtClean="0"/>
+              <a:t>Code chunks can have names, which is useful when making plots</a:t>
+            </a:r>
+          </a:p>
+          <a:p>
+            <a:r>
+              <a:rPr lang="en-US" dirty="0" smtClean="0"/>
+              <a:t>By default, code in a code chunk will be </a:t>
             </a:r>
             <a:r>
               <a:rPr lang="en-US" b="1" dirty="0" smtClean="0"/>
-              <a:t>should not be edited</a:t>
-            </a:r>
-            <a:endParaRPr lang="en-US" dirty="0"/>
-          </a:p>
-          <a:p>
-            <a:r>
-              <a:rPr lang="en-US" dirty="0" smtClean="0"/>
-              <a:t>Always edit the .</a:t>
-            </a:r>
-            <a:r>
-              <a:rPr lang="en-US" dirty="0" err="1" smtClean="0"/>
-              <a:t>Rmd</a:t>
-            </a:r>
-            <a:r>
-              <a:rPr lang="en-US" dirty="0" smtClean="0"/>
-              <a:t> file</a:t>
+              <a:t>echoed</a:t>
+            </a:r>
+            <a:r>
+              <a:rPr lang="en-US" dirty="0" smtClean="0"/>
+              <a:t>, as will the </a:t>
+            </a:r>
+            <a:r>
+              <a:rPr lang="en-US" b="1" dirty="0" smtClean="0"/>
+              <a:t>result</a:t>
+            </a:r>
+            <a:r>
+              <a:rPr lang="en-US" dirty="0" smtClean="0"/>
+              <a:t> of the computation (if there is anything to print)</a:t>
             </a:r>
           </a:p>
         </p:txBody>
@@ -6624,7 +6674,7 @@
     </p:spTree>
     <p:extLst>
       <p:ext uri="{BB962C8B-B14F-4D97-AF65-F5344CB8AC3E}">
-        <p14:creationId xmlns:p14="http://schemas.microsoft.com/office/powerpoint/2010/main" val="2383693508"/>
+        <p14:creationId xmlns:p14="http://schemas.microsoft.com/office/powerpoint/2010/main" val="3519303665"/>
       </p:ext>
     </p:extLst>
   </p:cSld>
@@ -6663,51 +6713,122 @@
         </p:nvSpPr>
         <p:spPr/>
         <p:txBody>
+          <a:bodyPr>
+            <a:normAutofit fontScale="90000"/>
+          </a:bodyPr>
+          <a:lstStyle/>
+          <a:p>
+            <a:r>
+              <a:rPr lang="en-US" dirty="0" smtClean="0"/>
+              <a:t>Processing R Markdown Documents</a:t>
+            </a:r>
+            <a:endParaRPr lang="en-US" dirty="0"/>
+          </a:p>
+        </p:txBody>
+      </p:sp>
+      <p:sp>
+        <p:nvSpPr>
+          <p:cNvPr id="3" name="Content Placeholder 2"/>
+          <p:cNvSpPr>
+            <a:spLocks noGrp="1"/>
+          </p:cNvSpPr>
+          <p:nvPr>
+            <p:ph idx="1"/>
+          </p:nvPr>
+        </p:nvSpPr>
+        <p:spPr/>
+        <p:txBody>
           <a:bodyPr/>
           <a:lstStyle/>
           <a:p>
             <a:r>
               <a:rPr lang="en-US" dirty="0" smtClean="0"/>
-              <a:t>Chunk Options</a:t>
+              <a:t>The order is</a:t>
+            </a:r>
+          </a:p>
+          <a:p>
+            <a:pPr lvl="1"/>
+            <a:r>
+              <a:rPr lang="en-US" dirty="0" err="1" smtClean="0"/>
+              <a:t>First.Rmd</a:t>
+            </a:r>
+            <a:r>
+              <a:rPr lang="en-US" dirty="0" smtClean="0"/>
+              <a:t> (written by you!)</a:t>
+            </a:r>
+            <a:endParaRPr lang="en-US" dirty="0" smtClean="0"/>
+          </a:p>
+          <a:p>
+            <a:pPr lvl="1"/>
+            <a:r>
+              <a:rPr lang="en-US" dirty="0" err="1" smtClean="0"/>
+              <a:t>First.md</a:t>
+            </a:r>
+            <a:r>
+              <a:rPr lang="en-US" dirty="0" smtClean="0"/>
+              <a:t> (created by </a:t>
+            </a:r>
+            <a:r>
+              <a:rPr lang="en-US" dirty="0" err="1" smtClean="0"/>
+              <a:t>knitr</a:t>
+            </a:r>
+            <a:r>
+              <a:rPr lang="en-US" dirty="0" smtClean="0"/>
+              <a:t>)</a:t>
+            </a:r>
+            <a:endParaRPr lang="en-US" dirty="0" smtClean="0"/>
+          </a:p>
+          <a:p>
+            <a:pPr lvl="1"/>
+            <a:r>
+              <a:rPr lang="en-US" dirty="0" err="1" smtClean="0"/>
+              <a:t>First.html</a:t>
+            </a:r>
+            <a:r>
+              <a:rPr lang="en-US" dirty="0" smtClean="0"/>
+              <a:t> (created by </a:t>
+            </a:r>
+            <a:r>
+              <a:rPr lang="en-US" dirty="0" err="1" smtClean="0"/>
+              <a:t>knitr</a:t>
+            </a:r>
+            <a:r>
+              <a:rPr lang="en-US" dirty="0" smtClean="0"/>
+              <a:t>)</a:t>
+            </a:r>
+            <a:endParaRPr lang="en-US" dirty="0" smtClean="0"/>
+          </a:p>
+          <a:p>
+            <a:r>
+              <a:rPr lang="en-US" dirty="0" smtClean="0"/>
+              <a:t>The .md file (and the .html file) are not things we care about and </a:t>
+            </a:r>
+            <a:r>
+              <a:rPr lang="en-US" b="1" dirty="0" smtClean="0"/>
+              <a:t>should not be edited</a:t>
             </a:r>
             <a:endParaRPr lang="en-US" dirty="0"/>
           </a:p>
-        </p:txBody>
-      </p:sp>
-      <p:pic>
-        <p:nvPicPr>
-          <p:cNvPr id="4" name="Picture 3" descr="Screen Shot 2013-04-25 at 11.28.38 AM.png"/>
-          <p:cNvPicPr>
-            <a:picLocks noChangeAspect="1"/>
-          </p:cNvPicPr>
-          <p:nvPr/>
-        </p:nvPicPr>
-        <p:blipFill>
-          <a:blip r:embed="rId2">
-            <a:extLst>
-              <a:ext uri="{28A0092B-C50C-407E-A947-70E740481C1C}">
-                <a14:useLocalDpi xmlns:a14="http://schemas.microsoft.com/office/drawing/2010/main" val="0"/>
-              </a:ext>
-            </a:extLst>
-          </a:blip>
-          <a:stretch>
-            <a:fillRect/>
-          </a:stretch>
-        </p:blipFill>
-        <p:spPr>
-          <a:xfrm>
-            <a:off x="561549" y="2102801"/>
-            <a:ext cx="8223669" cy="4391033"/>
-          </a:xfrm>
-          <a:prstGeom prst="rect">
-            <a:avLst/>
-          </a:prstGeom>
-        </p:spPr>
-      </p:pic>
+          <a:p>
+            <a:r>
+              <a:rPr lang="en-US" dirty="0" smtClean="0"/>
+              <a:t>Always edit the .</a:t>
+            </a:r>
+            <a:r>
+              <a:rPr lang="en-US" dirty="0" err="1" smtClean="0"/>
+              <a:t>Rmd</a:t>
+            </a:r>
+            <a:r>
+              <a:rPr lang="en-US" dirty="0" smtClean="0"/>
+              <a:t> file</a:t>
+            </a:r>
+          </a:p>
+        </p:txBody>
+      </p:sp>
     </p:spTree>
     <p:extLst>
       <p:ext uri="{BB962C8B-B14F-4D97-AF65-F5344CB8AC3E}">
-        <p14:creationId xmlns:p14="http://schemas.microsoft.com/office/powerpoint/2010/main" val="3116510367"/>
+        <p14:creationId xmlns:p14="http://schemas.microsoft.com/office/powerpoint/2010/main" val="2383693508"/>
       </p:ext>
     </p:extLst>
   </p:cSld>
@@ -6759,7 +6880,7 @@
       </p:sp>
       <p:pic>
         <p:nvPicPr>
-          <p:cNvPr id="5" name="Picture 4" descr="Screen Shot 2013-04-25 at 11.31.55 AM.png"/>
+          <p:cNvPr id="4" name="Picture 3" descr="Screen Shot 2013-04-25 at 11.28.38 AM.png"/>
           <p:cNvPicPr>
             <a:picLocks noChangeAspect="1"/>
           </p:cNvPicPr>
@@ -6779,8 +6900,8 @@
         </p:blipFill>
         <p:spPr>
           <a:xfrm>
-            <a:off x="457200" y="2336799"/>
-            <a:ext cx="8229600" cy="3652825"/>
+            <a:off x="561549" y="2102801"/>
+            <a:ext cx="8223669" cy="4391033"/>
           </a:xfrm>
           <a:prstGeom prst="rect">
             <a:avLst/>
@@ -6790,7 +6911,7 @@
     </p:spTree>
     <p:extLst>
       <p:ext uri="{BB962C8B-B14F-4D97-AF65-F5344CB8AC3E}">
-        <p14:creationId xmlns:p14="http://schemas.microsoft.com/office/powerpoint/2010/main" val="4167047184"/>
+        <p14:creationId xmlns:p14="http://schemas.microsoft.com/office/powerpoint/2010/main" val="3116510367"/>
       </p:ext>
     </p:extLst>
   </p:cSld>
@@ -6842,7 +6963,7 @@
       </p:sp>
       <p:pic>
         <p:nvPicPr>
-          <p:cNvPr id="4" name="Picture 3" descr="Screen Shot 2013-04-25 at 11.32.12 AM.png"/>
+          <p:cNvPr id="5" name="Picture 4" descr="Screen Shot 2013-04-25 at 11.31.55 AM.png"/>
           <p:cNvPicPr>
             <a:picLocks noChangeAspect="1"/>
           </p:cNvPicPr>
@@ -6862,8 +6983,8 @@
         </p:blipFill>
         <p:spPr>
           <a:xfrm>
-            <a:off x="182929" y="2806700"/>
-            <a:ext cx="8877279" cy="2163558"/>
+            <a:off x="457200" y="2336799"/>
+            <a:ext cx="8229600" cy="3652825"/>
           </a:xfrm>
           <a:prstGeom prst="rect">
             <a:avLst/>
@@ -6873,7 +6994,7 @@
     </p:spTree>
     <p:extLst>
       <p:ext uri="{BB962C8B-B14F-4D97-AF65-F5344CB8AC3E}">
-        <p14:creationId xmlns:p14="http://schemas.microsoft.com/office/powerpoint/2010/main" val="3987760435"/>
+        <p14:creationId xmlns:p14="http://schemas.microsoft.com/office/powerpoint/2010/main" val="4167047184"/>
       </p:ext>
     </p:extLst>
   </p:cSld>
@@ -6917,7 +7038,7 @@
           <a:p>
             <a:r>
               <a:rPr lang="en-US" dirty="0" smtClean="0"/>
-              <a:t>Inline Computation</a:t>
+              <a:t>Chunk Options</a:t>
             </a:r>
             <a:endParaRPr lang="en-US" dirty="0"/>
           </a:p>
@@ -6925,7 +7046,7 @@
       </p:sp>
       <p:pic>
         <p:nvPicPr>
-          <p:cNvPr id="3" name="Picture 2" descr="Screen Shot 2013-04-25 at 11.35.45 AM.png"/>
+          <p:cNvPr id="4" name="Picture 3" descr="Screen Shot 2013-04-25 at 11.32.12 AM.png"/>
           <p:cNvPicPr>
             <a:picLocks noChangeAspect="1"/>
           </p:cNvPicPr>
@@ -6945,56 +7066,18 @@
         </p:blipFill>
         <p:spPr>
           <a:xfrm>
-            <a:off x="342497" y="2133599"/>
-            <a:ext cx="8372426" cy="3437459"/>
+            <a:off x="182929" y="2806700"/>
+            <a:ext cx="8877279" cy="2163558"/>
           </a:xfrm>
           <a:prstGeom prst="rect">
             <a:avLst/>
           </a:prstGeom>
         </p:spPr>
       </p:pic>
-      <p:sp>
-        <p:nvSpPr>
-          <p:cNvPr id="4" name="TextBox 3"/>
-          <p:cNvSpPr txBox="1"/>
-          <p:nvPr/>
-        </p:nvSpPr>
-        <p:spPr>
-          <a:xfrm>
-            <a:off x="682770" y="6130895"/>
-            <a:ext cx="6646058" cy="369332"/>
-          </a:xfrm>
-          <a:prstGeom prst="rect">
-            <a:avLst/>
-          </a:prstGeom>
-          <a:noFill/>
-        </p:spPr>
-        <p:txBody>
-          <a:bodyPr wrap="none" rtlCol="0">
-            <a:spAutoFit/>
-          </a:bodyPr>
-          <a:lstStyle/>
-          <a:p>
-            <a:r>
-              <a:rPr lang="en-US" dirty="0" smtClean="0"/>
-              <a:t>(NOTE: Look at ?</a:t>
-            </a:r>
-            <a:r>
-              <a:rPr lang="en-US" dirty="0" err="1" smtClean="0"/>
-              <a:t>strptime</a:t>
-            </a:r>
-            <a:r>
-              <a:rPr lang="en-US" dirty="0" smtClean="0"/>
-              <a:t> for a list of all the date/time format codes.)</a:t>
-            </a:r>
-            <a:endParaRPr lang="en-US" dirty="0"/>
-          </a:p>
-        </p:txBody>
-      </p:sp>
     </p:spTree>
     <p:extLst>
       <p:ext uri="{BB962C8B-B14F-4D97-AF65-F5344CB8AC3E}">
-        <p14:creationId xmlns:p14="http://schemas.microsoft.com/office/powerpoint/2010/main" val="3580847445"/>
+        <p14:creationId xmlns:p14="http://schemas.microsoft.com/office/powerpoint/2010/main" val="3987760435"/>
       </p:ext>
     </p:extLst>
   </p:cSld>
@@ -7046,7 +7129,7 @@
       </p:sp>
       <p:pic>
         <p:nvPicPr>
-          <p:cNvPr id="3" name="Picture 2" descr="Screen Shot 2013-04-25 at 11.36.50 AM.png"/>
+          <p:cNvPr id="3" name="Picture 2" descr="Screen Shot 2013-04-25 at 11.35.45 AM.png"/>
           <p:cNvPicPr>
             <a:picLocks noChangeAspect="1"/>
           </p:cNvPicPr>
@@ -7066,18 +7149,56 @@
         </p:blipFill>
         <p:spPr>
           <a:xfrm>
-            <a:off x="423162" y="2578099"/>
-            <a:ext cx="8262032" cy="2747177"/>
+            <a:off x="342497" y="2133599"/>
+            <a:ext cx="8372426" cy="3437459"/>
           </a:xfrm>
           <a:prstGeom prst="rect">
             <a:avLst/>
           </a:prstGeom>
         </p:spPr>
       </p:pic>
+      <p:sp>
+        <p:nvSpPr>
+          <p:cNvPr id="4" name="TextBox 3"/>
+          <p:cNvSpPr txBox="1"/>
+          <p:nvPr/>
+        </p:nvSpPr>
+        <p:spPr>
+          <a:xfrm>
+            <a:off x="682770" y="6130895"/>
+            <a:ext cx="6646058" cy="369332"/>
+          </a:xfrm>
+          <a:prstGeom prst="rect">
+            <a:avLst/>
+          </a:prstGeom>
+          <a:noFill/>
+        </p:spPr>
+        <p:txBody>
+          <a:bodyPr wrap="none" rtlCol="0">
+            <a:spAutoFit/>
+          </a:bodyPr>
+          <a:lstStyle/>
+          <a:p>
+            <a:r>
+              <a:rPr lang="en-US" dirty="0" smtClean="0"/>
+              <a:t>(NOTE: Look at ?</a:t>
+            </a:r>
+            <a:r>
+              <a:rPr lang="en-US" dirty="0" err="1" smtClean="0"/>
+              <a:t>strptime</a:t>
+            </a:r>
+            <a:r>
+              <a:rPr lang="en-US" dirty="0" smtClean="0"/>
+              <a:t> for a list of all the date/time format codes.)</a:t>
+            </a:r>
+            <a:endParaRPr lang="en-US" dirty="0"/>
+          </a:p>
+        </p:txBody>
+      </p:sp>
     </p:spTree>
     <p:extLst>
       <p:ext uri="{BB962C8B-B14F-4D97-AF65-F5344CB8AC3E}">
-        <p14:creationId xmlns:p14="http://schemas.microsoft.com/office/powerpoint/2010/main" val="4075354786"/>
+        <p14:creationId xmlns:p14="http://schemas.microsoft.com/office/powerpoint/2010/main" val="3580847445"/>
       </p:ext>
     </p:extLst>
   </p:cSld>
@@ -7121,7 +7242,7 @@
           <a:p>
             <a:r>
               <a:rPr lang="en-US" dirty="0" smtClean="0"/>
-              <a:t>Graphics</a:t>
+              <a:t>Inline Computation</a:t>
             </a:r>
             <a:endParaRPr lang="en-US" dirty="0"/>
           </a:p>
@@ -7129,7 +7250,7 @@
       </p:sp>
       <p:pic>
         <p:nvPicPr>
-          <p:cNvPr id="4" name="Picture 3" descr="Screen Shot 2013-04-25 at 11.45.20 AM.png"/>
+          <p:cNvPr id="3" name="Picture 2" descr="Screen Shot 2013-04-25 at 11.36.50 AM.png"/>
           <p:cNvPicPr>
             <a:picLocks noChangeAspect="1"/>
           </p:cNvPicPr>
@@ -7149,8 +7270,8 @@
         </p:blipFill>
         <p:spPr>
           <a:xfrm>
-            <a:off x="1611338" y="1510164"/>
-            <a:ext cx="6057115" cy="5084986"/>
+            <a:off x="423162" y="2578099"/>
+            <a:ext cx="8262032" cy="2747177"/>
           </a:xfrm>
           <a:prstGeom prst="rect">
             <a:avLst/>
@@ -7160,7 +7281,7 @@
     </p:spTree>
     <p:extLst>
       <p:ext uri="{BB962C8B-B14F-4D97-AF65-F5344CB8AC3E}">
-        <p14:creationId xmlns:p14="http://schemas.microsoft.com/office/powerpoint/2010/main" val="72142841"/>
+        <p14:creationId xmlns:p14="http://schemas.microsoft.com/office/powerpoint/2010/main" val="4075354786"/>
       </p:ext>
     </p:extLst>
   </p:cSld>
@@ -7404,7 +7525,7 @@
       </p:sp>
       <p:pic>
         <p:nvPicPr>
-          <p:cNvPr id="4" name="Picture 3" descr="Screen Shot 2013-04-25 at 11.45.01 AM.png"/>
+          <p:cNvPr id="4" name="Picture 3" descr="Screen Shot 2013-04-25 at 11.45.20 AM.png"/>
           <p:cNvPicPr>
             <a:picLocks noChangeAspect="1"/>
           </p:cNvPicPr>
@@ -7424,8 +7545,8 @@
         </p:blipFill>
         <p:spPr>
           <a:xfrm>
-            <a:off x="1584027" y="1429997"/>
-            <a:ext cx="6044735" cy="5373098"/>
+            <a:off x="1611338" y="1510164"/>
+            <a:ext cx="6057115" cy="5084986"/>
           </a:xfrm>
           <a:prstGeom prst="rect">
             <a:avLst/>
@@ -7435,7 +7556,7 @@
     </p:spTree>
     <p:extLst>
       <p:ext uri="{BB962C8B-B14F-4D97-AF65-F5344CB8AC3E}">
-        <p14:creationId xmlns:p14="http://schemas.microsoft.com/office/powerpoint/2010/main" val="3476766765"/>
+        <p14:creationId xmlns:p14="http://schemas.microsoft.com/office/powerpoint/2010/main" val="72142841"/>
       </p:ext>
     </p:extLst>
   </p:cSld>
@@ -7479,15 +7600,7 @@
           <a:p>
             <a:r>
               <a:rPr lang="en-US" dirty="0" smtClean="0"/>
-              <a:t>Graphics: What </a:t>
-            </a:r>
-            <a:r>
-              <a:rPr lang="en-US" dirty="0" err="1" smtClean="0"/>
-              <a:t>knitr</a:t>
-            </a:r>
-            <a:r>
-              <a:rPr lang="en-US" dirty="0" smtClean="0"/>
-              <a:t> Produces</a:t>
+              <a:t>Graphics</a:t>
             </a:r>
             <a:endParaRPr lang="en-US" dirty="0"/>
           </a:p>
@@ -7495,7 +7608,7 @@
       </p:sp>
       <p:pic>
         <p:nvPicPr>
-          <p:cNvPr id="3" name="Picture 2" descr="Screen Shot 2013-04-25 at 11.46.23 AM.png"/>
+          <p:cNvPr id="4" name="Picture 3" descr="Screen Shot 2013-04-25 at 11.45.01 AM.png"/>
           <p:cNvPicPr>
             <a:picLocks noChangeAspect="1"/>
           </p:cNvPicPr>
@@ -7515,8 +7628,8 @@
         </p:blipFill>
         <p:spPr>
           <a:xfrm>
-            <a:off x="449551" y="1562099"/>
-            <a:ext cx="8387454" cy="5251119"/>
+            <a:off x="1584027" y="1429997"/>
+            <a:ext cx="6044735" cy="5373098"/>
           </a:xfrm>
           <a:prstGeom prst="rect">
             <a:avLst/>
@@ -7526,7 +7639,7 @@
     </p:spTree>
     <p:extLst>
       <p:ext uri="{BB962C8B-B14F-4D97-AF65-F5344CB8AC3E}">
-        <p14:creationId xmlns:p14="http://schemas.microsoft.com/office/powerpoint/2010/main" val="3273544908"/>
+        <p14:creationId xmlns:p14="http://schemas.microsoft.com/office/powerpoint/2010/main" val="3476766765"/>
       </p:ext>
     </p:extLst>
   </p:cSld>
@@ -7570,7 +7683,15 @@
           <a:p>
             <a:r>
               <a:rPr lang="en-US" dirty="0" smtClean="0"/>
-              <a:t>Setting Global Options</a:t>
+              <a:t>Graphics: What </a:t>
+            </a:r>
+            <a:r>
+              <a:rPr lang="en-US" dirty="0" err="1" smtClean="0"/>
+              <a:t>knitr</a:t>
+            </a:r>
+            <a:r>
+              <a:rPr lang="en-US" dirty="0" smtClean="0"/>
+              <a:t> Produces</a:t>
             </a:r>
             <a:endParaRPr lang="en-US" dirty="0"/>
           </a:p>
@@ -7578,7 +7699,7 @@
       </p:sp>
       <p:pic>
         <p:nvPicPr>
-          <p:cNvPr id="3" name="Picture 2" descr="Screen Shot 2013-04-25 at 12.01.51 PM.png"/>
+          <p:cNvPr id="3" name="Picture 2" descr="Screen Shot 2013-04-25 at 11.46.23 AM.png"/>
           <p:cNvPicPr>
             <a:picLocks noChangeAspect="1"/>
           </p:cNvPicPr>
@@ -7598,8 +7719,8 @@
         </p:blipFill>
         <p:spPr>
           <a:xfrm>
-            <a:off x="1320688" y="1417639"/>
-            <a:ext cx="6646539" cy="5338283"/>
+            <a:off x="449551" y="1562099"/>
+            <a:ext cx="8387454" cy="5251119"/>
           </a:xfrm>
           <a:prstGeom prst="rect">
             <a:avLst/>
@@ -7609,7 +7730,7 @@
     </p:spTree>
     <p:extLst>
       <p:ext uri="{BB962C8B-B14F-4D97-AF65-F5344CB8AC3E}">
-        <p14:creationId xmlns:p14="http://schemas.microsoft.com/office/powerpoint/2010/main" val="4106043667"/>
+        <p14:creationId xmlns:p14="http://schemas.microsoft.com/office/powerpoint/2010/main" val="3273544908"/>
       </p:ext>
     </p:extLst>
   </p:cSld>
@@ -7648,6 +7769,89 @@
         </p:nvSpPr>
         <p:spPr/>
         <p:txBody>
+          <a:bodyPr/>
+          <a:lstStyle/>
+          <a:p>
+            <a:r>
+              <a:rPr lang="en-US" dirty="0" smtClean="0"/>
+              <a:t>Setting Global Options</a:t>
+            </a:r>
+            <a:endParaRPr lang="en-US" dirty="0"/>
+          </a:p>
+        </p:txBody>
+      </p:sp>
+      <p:pic>
+        <p:nvPicPr>
+          <p:cNvPr id="3" name="Picture 2" descr="Screen Shot 2013-04-25 at 12.01.51 PM.png"/>
+          <p:cNvPicPr>
+            <a:picLocks noChangeAspect="1"/>
+          </p:cNvPicPr>
+          <p:nvPr/>
+        </p:nvPicPr>
+        <p:blipFill>
+          <a:blip r:embed="rId2">
+            <a:extLst>
+              <a:ext uri="{28A0092B-C50C-407E-A947-70E740481C1C}">
+                <a14:useLocalDpi xmlns:a14="http://schemas.microsoft.com/office/drawing/2010/main" val="0"/>
+              </a:ext>
+            </a:extLst>
+          </a:blip>
+          <a:stretch>
+            <a:fillRect/>
+          </a:stretch>
+        </p:blipFill>
+        <p:spPr>
+          <a:xfrm>
+            <a:off x="1320688" y="1417639"/>
+            <a:ext cx="6646539" cy="5338283"/>
+          </a:xfrm>
+          <a:prstGeom prst="rect">
+            <a:avLst/>
+          </a:prstGeom>
+        </p:spPr>
+      </p:pic>
+    </p:spTree>
+    <p:extLst>
+      <p:ext uri="{BB962C8B-B14F-4D97-AF65-F5344CB8AC3E}">
+        <p14:creationId xmlns:p14="http://schemas.microsoft.com/office/powerpoint/2010/main" val="4106043667"/>
+      </p:ext>
+    </p:extLst>
+  </p:cSld>
+  <p:clrMapOvr>
+    <a:masterClrMapping/>
+  </p:clrMapOvr>
+</p:sld>
+</file>
+
+<file path=ppt/slides/slide44.xml><?xml version="1.0" encoding="utf-8"?>
+<p:sld xmlns:a="http://schemas.openxmlformats.org/drawingml/2006/main" xmlns:r="http://schemas.openxmlformats.org/officeDocument/2006/relationships" xmlns:p="http://schemas.openxmlformats.org/presentationml/2006/main">
+  <p:cSld>
+    <p:spTree>
+      <p:nvGrpSpPr>
+        <p:cNvPr id="1" name=""/>
+        <p:cNvGrpSpPr/>
+        <p:nvPr/>
+      </p:nvGrpSpPr>
+      <p:grpSpPr>
+        <a:xfrm>
+          <a:off x="0" y="0"/>
+          <a:ext cx="0" cy="0"/>
+          <a:chOff x="0" y="0"/>
+          <a:chExt cx="0" cy="0"/>
+        </a:xfrm>
+      </p:grpSpPr>
+      <p:sp>
+        <p:nvSpPr>
+          <p:cNvPr id="2" name="Title 1"/>
+          <p:cNvSpPr>
+            <a:spLocks noGrp="1"/>
+          </p:cNvSpPr>
+          <p:nvPr>
+            <p:ph type="title"/>
+          </p:nvPr>
+        </p:nvSpPr>
+        <p:spPr/>
+        <p:txBody>
           <a:bodyPr>
             <a:normAutofit/>
           </a:bodyPr>
@@ -7711,7 +7915,7 @@
 </p:sld>
 </file>
 
-<file path=ppt/slides/slide44.xml><?xml version="1.0" encoding="utf-8"?>
+<file path=ppt/slides/slide45.xml><?xml version="1.0" encoding="utf-8"?>
 <p:sld xmlns:a="http://schemas.openxmlformats.org/drawingml/2006/main" xmlns:r="http://schemas.openxmlformats.org/officeDocument/2006/relationships" xmlns:p="http://schemas.openxmlformats.org/presentationml/2006/main">
   <p:cSld>
     <p:spTree>
@@ -7966,7 +8170,7 @@
 </p:sld>
 </file>
 
-<file path=ppt/slides/slide45.xml><?xml version="1.0" encoding="utf-8"?>
+<file path=ppt/slides/slide46.xml><?xml version="1.0" encoding="utf-8"?>
 <p:sld xmlns:a="http://schemas.openxmlformats.org/drawingml/2006/main" xmlns:r="http://schemas.openxmlformats.org/officeDocument/2006/relationships" xmlns:p="http://schemas.openxmlformats.org/presentationml/2006/main">
   <p:cSld>
     <p:spTree>
@@ -8060,126 +8264,6 @@
 </p:sld>
 </file>
 
-<file path=ppt/slides/slide46.xml><?xml version="1.0" encoding="utf-8"?>
-<p:sld xmlns:a="http://schemas.openxmlformats.org/drawingml/2006/main" xmlns:r="http://schemas.openxmlformats.org/officeDocument/2006/relationships" xmlns:p="http://schemas.openxmlformats.org/presentationml/2006/main">
-  <p:cSld>
-    <p:spTree>
-      <p:nvGrpSpPr>
-        <p:cNvPr id="1" name=""/>
-        <p:cNvGrpSpPr/>
-        <p:nvPr/>
-      </p:nvGrpSpPr>
-      <p:grpSpPr>
-        <a:xfrm>
-          <a:off x="0" y="0"/>
-          <a:ext cx="0" cy="0"/>
-          <a:chOff x="0" y="0"/>
-          <a:chExt cx="0" cy="0"/>
-        </a:xfrm>
-      </p:grpSpPr>
-      <p:sp>
-        <p:nvSpPr>
-          <p:cNvPr id="2" name="Title 1"/>
-          <p:cNvSpPr>
-            <a:spLocks noGrp="1"/>
-          </p:cNvSpPr>
-          <p:nvPr>
-            <p:ph type="title"/>
-          </p:nvPr>
-        </p:nvSpPr>
-        <p:spPr/>
-        <p:txBody>
-          <a:bodyPr/>
-          <a:lstStyle/>
-          <a:p>
-            <a:r>
-              <a:rPr lang="en-US" dirty="0"/>
-              <a:t>Caching Long Computations</a:t>
-            </a:r>
-          </a:p>
-        </p:txBody>
-      </p:sp>
-      <p:sp>
-        <p:nvSpPr>
-          <p:cNvPr id="3" name="Content Placeholder 2"/>
-          <p:cNvSpPr>
-            <a:spLocks noGrp="1"/>
-          </p:cNvSpPr>
-          <p:nvPr>
-            <p:ph idx="1"/>
-          </p:nvPr>
-        </p:nvSpPr>
-        <p:spPr>
-          <a:xfrm>
-            <a:off x="457200" y="1600201"/>
-            <a:ext cx="8229600" cy="4885712"/>
-          </a:xfrm>
-        </p:spPr>
-        <p:txBody>
-          <a:bodyPr>
-            <a:normAutofit fontScale="92500" lnSpcReduction="10000"/>
-          </a:bodyPr>
-          <a:lstStyle/>
-          <a:p>
-            <a:r>
-              <a:rPr lang="en-US" dirty="0" smtClean="0"/>
-              <a:t>Important for long documents with complex computations</a:t>
-            </a:r>
-          </a:p>
-          <a:p>
-            <a:r>
-              <a:rPr lang="en-US" dirty="0" smtClean="0"/>
-              <a:t>Set ‘cache = TRUE’ in chunk option to cache results</a:t>
-            </a:r>
-          </a:p>
-          <a:p>
-            <a:r>
-              <a:rPr lang="en-US" dirty="0" smtClean="0"/>
-              <a:t>Code has to be run once; results are then stored in a key-value database</a:t>
-            </a:r>
-          </a:p>
-          <a:p>
-            <a:r>
-              <a:rPr lang="en-US" dirty="0" smtClean="0"/>
-              <a:t>On subsequent runs, results are loaded from database rather than execute code</a:t>
-            </a:r>
-          </a:p>
-          <a:p>
-            <a:r>
-              <a:rPr lang="en-US" dirty="0" smtClean="0"/>
-              <a:t>If code changes, results are re-run</a:t>
-            </a:r>
-          </a:p>
-          <a:p>
-            <a:r>
-              <a:rPr lang="en-US" dirty="0" smtClean="0"/>
-              <a:t>Dependencies can be specified via ‘</a:t>
-            </a:r>
-            <a:r>
-              <a:rPr lang="en-US" dirty="0" err="1" smtClean="0"/>
-              <a:t>dependson</a:t>
-            </a:r>
-            <a:r>
-              <a:rPr lang="en-US" dirty="0" smtClean="0"/>
-              <a:t>’</a:t>
-            </a:r>
-            <a:endParaRPr lang="en-US" dirty="0"/>
-          </a:p>
-        </p:txBody>
-      </p:sp>
-    </p:spTree>
-    <p:extLst>
-      <p:ext uri="{BB962C8B-B14F-4D97-AF65-F5344CB8AC3E}">
-        <p14:creationId xmlns:p14="http://schemas.microsoft.com/office/powerpoint/2010/main" val="590979008"/>
-      </p:ext>
-    </p:extLst>
-  </p:cSld>
-  <p:clrMapOvr>
-    <a:masterClrMapping/>
-  </p:clrMapOvr>
-</p:sld>
-</file>
-
 <file path=ppt/slides/slide47.xml><?xml version="1.0" encoding="utf-8"?>
 <p:sld xmlns:a="http://schemas.openxmlformats.org/drawingml/2006/main" xmlns:r="http://schemas.openxmlformats.org/officeDocument/2006/relationships" xmlns:p="http://schemas.openxmlformats.org/presentationml/2006/main">
   <p:cSld>
@@ -8213,47 +8297,84 @@
           <a:lstStyle/>
           <a:p>
             <a:r>
-              <a:rPr lang="en-US" dirty="0" smtClean="0"/>
+              <a:rPr lang="en-US" dirty="0"/>
               <a:t>Caching Long Computations</a:t>
             </a:r>
+          </a:p>
+        </p:txBody>
+      </p:sp>
+      <p:sp>
+        <p:nvSpPr>
+          <p:cNvPr id="3" name="Content Placeholder 2"/>
+          <p:cNvSpPr>
+            <a:spLocks noGrp="1"/>
+          </p:cNvSpPr>
+          <p:nvPr>
+            <p:ph idx="1"/>
+          </p:nvPr>
+        </p:nvSpPr>
+        <p:spPr>
+          <a:xfrm>
+            <a:off x="457200" y="1600201"/>
+            <a:ext cx="8229600" cy="4885712"/>
+          </a:xfrm>
+        </p:spPr>
+        <p:txBody>
+          <a:bodyPr>
+            <a:normAutofit fontScale="92500" lnSpcReduction="10000"/>
+          </a:bodyPr>
+          <a:lstStyle/>
+          <a:p>
+            <a:r>
+              <a:rPr lang="en-US" dirty="0" smtClean="0"/>
+              <a:t>Important for long documents with complex computations</a:t>
+            </a:r>
+          </a:p>
+          <a:p>
+            <a:r>
+              <a:rPr lang="en-US" dirty="0" smtClean="0"/>
+              <a:t>Set ‘cache = TRUE’ in chunk option to cache results</a:t>
+            </a:r>
+          </a:p>
+          <a:p>
+            <a:r>
+              <a:rPr lang="en-US" dirty="0" smtClean="0"/>
+              <a:t>Code has to be run once; results are then stored in a key-value database</a:t>
+            </a:r>
+          </a:p>
+          <a:p>
+            <a:r>
+              <a:rPr lang="en-US" dirty="0" smtClean="0"/>
+              <a:t>On subsequent runs, results are loaded from database rather than execute code</a:t>
+            </a:r>
+          </a:p>
+          <a:p>
+            <a:r>
+              <a:rPr lang="en-US" dirty="0" smtClean="0"/>
+              <a:t>If code changes, results are re-run</a:t>
+            </a:r>
+          </a:p>
+          <a:p>
+            <a:r>
+              <a:rPr lang="en-US" dirty="0" smtClean="0"/>
+              <a:t>Dependencies can be specified via ‘</a:t>
+            </a:r>
+            <a:r>
+              <a:rPr lang="en-US" dirty="0" err="1" smtClean="0"/>
+              <a:t>dependson</a:t>
+            </a:r>
+            <a:r>
+              <a:rPr lang="en-US" dirty="0" smtClean="0"/>
+              <a:t>’</a:t>
+            </a:r>
             <a:endParaRPr lang="en-US" dirty="0"/>
           </a:p>
         </p:txBody>
       </p:sp>
-      <p:pic>
-        <p:nvPicPr>
-          <p:cNvPr id="3" name="Picture 2" descr="Screen Shot 2013-04-25 at 12.14.03 PM.png"/>
-          <p:cNvPicPr>
-            <a:picLocks noChangeAspect="1"/>
-          </p:cNvPicPr>
-          <p:nvPr/>
-        </p:nvPicPr>
-        <p:blipFill>
-          <a:blip r:embed="rId2">
-            <a:extLst>
-              <a:ext uri="{28A0092B-C50C-407E-A947-70E740481C1C}">
-                <a14:useLocalDpi xmlns:a14="http://schemas.microsoft.com/office/drawing/2010/main" val="0"/>
-              </a:ext>
-            </a:extLst>
-          </a:blip>
-          <a:stretch>
-            <a:fillRect/>
-          </a:stretch>
-        </p:blipFill>
-        <p:spPr>
-          <a:xfrm>
-            <a:off x="615815" y="1579860"/>
-            <a:ext cx="8070985" cy="5184421"/>
-          </a:xfrm>
-          <a:prstGeom prst="rect">
-            <a:avLst/>
-          </a:prstGeom>
-        </p:spPr>
-      </p:pic>
     </p:spTree>
     <p:extLst>
       <p:ext uri="{BB962C8B-B14F-4D97-AF65-F5344CB8AC3E}">
-        <p14:creationId xmlns:p14="http://schemas.microsoft.com/office/powerpoint/2010/main" val="3383905963"/>
+        <p14:creationId xmlns:p14="http://schemas.microsoft.com/office/powerpoint/2010/main" val="590979008"/>
       </p:ext>
     </p:extLst>
   </p:cSld>
@@ -8296,15 +8417,16 @@
           <a:lstStyle/>
           <a:p>
             <a:r>
-              <a:rPr lang="en-US" dirty="0"/>
+              <a:rPr lang="en-US" dirty="0" smtClean="0"/>
               <a:t>Caching Long Computations</a:t>
             </a:r>
+            <a:endParaRPr lang="en-US" dirty="0"/>
           </a:p>
         </p:txBody>
       </p:sp>
       <p:pic>
         <p:nvPicPr>
-          <p:cNvPr id="3" name="Picture 2" descr="Screen Shot 2013-04-25 at 12.18.36 PM.png"/>
+          <p:cNvPr id="3" name="Picture 2" descr="Screen Shot 2013-04-25 at 12.14.03 PM.png"/>
           <p:cNvPicPr>
             <a:picLocks noChangeAspect="1"/>
           </p:cNvPicPr>
@@ -8324,8 +8446,8 @@
         </p:blipFill>
         <p:spPr>
           <a:xfrm>
-            <a:off x="962278" y="1460499"/>
-            <a:ext cx="7258276" cy="5289639"/>
+            <a:off x="615815" y="1579860"/>
+            <a:ext cx="8070985" cy="5184421"/>
           </a:xfrm>
           <a:prstGeom prst="rect">
             <a:avLst/>
@@ -8335,7 +8457,7 @@
     </p:spTree>
     <p:extLst>
       <p:ext uri="{BB962C8B-B14F-4D97-AF65-F5344CB8AC3E}">
-        <p14:creationId xmlns:p14="http://schemas.microsoft.com/office/powerpoint/2010/main" val="3186945621"/>
+        <p14:creationId xmlns:p14="http://schemas.microsoft.com/office/powerpoint/2010/main" val="3383905963"/>
       </p:ext>
     </p:extLst>
   </p:cSld>
@@ -8378,119 +8500,46 @@
           <a:lstStyle/>
           <a:p>
             <a:r>
-              <a:rPr lang="en-US" dirty="0" smtClean="0"/>
-              <a:t>Summary of Basic Options</a:t>
-            </a:r>
-            <a:endParaRPr lang="en-US" dirty="0"/>
-          </a:p>
-        </p:txBody>
-      </p:sp>
-      <p:sp>
-        <p:nvSpPr>
-          <p:cNvPr id="3" name="Content Placeholder 2"/>
-          <p:cNvSpPr>
-            <a:spLocks noGrp="1"/>
-          </p:cNvSpPr>
-          <p:nvPr>
-            <p:ph idx="1"/>
-          </p:nvPr>
-        </p:nvSpPr>
-        <p:spPr/>
-        <p:txBody>
-          <a:bodyPr/>
-          <a:lstStyle/>
-          <a:p>
-            <a:r>
-              <a:rPr lang="en-US" dirty="0" smtClean="0"/>
-              <a:t>Controlling Output</a:t>
-            </a:r>
-          </a:p>
-          <a:p>
-            <a:pPr lvl="1"/>
-            <a:r>
-              <a:rPr lang="en-US" dirty="0" smtClean="0"/>
-              <a:t>results: “markup”, “</a:t>
-            </a:r>
-            <a:r>
-              <a:rPr lang="en-US" dirty="0" err="1" smtClean="0"/>
-              <a:t>asis</a:t>
-            </a:r>
-            <a:r>
-              <a:rPr lang="en-US" dirty="0" smtClean="0"/>
-              <a:t>”, “hide”</a:t>
-            </a:r>
-          </a:p>
-          <a:p>
-            <a:pPr lvl="1"/>
-            <a:r>
-              <a:rPr lang="en-US" dirty="0" smtClean="0"/>
-              <a:t>echo: TRUE, FALSE</a:t>
-            </a:r>
-          </a:p>
-          <a:p>
-            <a:pPr lvl="1"/>
-            <a:r>
-              <a:rPr lang="en-US" dirty="0" err="1" smtClean="0"/>
-              <a:t>eval</a:t>
-            </a:r>
-            <a:r>
-              <a:rPr lang="en-US" dirty="0" smtClean="0"/>
-              <a:t>: TRUE, FALSE</a:t>
-            </a:r>
-          </a:p>
-          <a:p>
-            <a:r>
-              <a:rPr lang="en-US" dirty="0" smtClean="0"/>
-              <a:t>Figures</a:t>
-            </a:r>
-          </a:p>
-          <a:p>
-            <a:pPr lvl="1"/>
-            <a:r>
-              <a:rPr lang="en-US" dirty="0" err="1" smtClean="0"/>
-              <a:t>fig.width</a:t>
-            </a:r>
-            <a:r>
-              <a:rPr lang="en-US" dirty="0" smtClean="0"/>
-              <a:t>: width of plot (passed to graphics </a:t>
-            </a:r>
-            <a:r>
-              <a:rPr lang="en-US" dirty="0" err="1" smtClean="0"/>
-              <a:t>dev</a:t>
-            </a:r>
-            <a:r>
-              <a:rPr lang="en-US" dirty="0" smtClean="0"/>
-              <a:t>)</a:t>
-            </a:r>
-          </a:p>
-          <a:p>
-            <a:pPr lvl="1"/>
-            <a:r>
-              <a:rPr lang="en-US" dirty="0" err="1" smtClean="0"/>
-              <a:t>fig.height</a:t>
-            </a:r>
-            <a:r>
-              <a:rPr lang="en-US" dirty="0" smtClean="0"/>
-              <a:t>: height of plot</a:t>
-            </a:r>
-          </a:p>
-          <a:p>
-            <a:pPr lvl="1"/>
-            <a:r>
-              <a:rPr lang="en-US" dirty="0" err="1" smtClean="0"/>
-              <a:t>fig.path</a:t>
-            </a:r>
-            <a:r>
-              <a:rPr lang="en-US" dirty="0" smtClean="0"/>
-              <a:t>: directory to put figures (“figure/”)</a:t>
-            </a:r>
-          </a:p>
-        </p:txBody>
-      </p:sp>
+              <a:rPr lang="en-US" dirty="0"/>
+              <a:t>Caching Long Computations</a:t>
+            </a:r>
+          </a:p>
+        </p:txBody>
+      </p:sp>
+      <p:pic>
+        <p:nvPicPr>
+          <p:cNvPr id="3" name="Picture 2" descr="Screen Shot 2013-04-25 at 12.18.36 PM.png"/>
+          <p:cNvPicPr>
+            <a:picLocks noChangeAspect="1"/>
+          </p:cNvPicPr>
+          <p:nvPr/>
+        </p:nvPicPr>
+        <p:blipFill>
+          <a:blip r:embed="rId2">
+            <a:extLst>
+              <a:ext uri="{28A0092B-C50C-407E-A947-70E740481C1C}">
+                <a14:useLocalDpi xmlns:a14="http://schemas.microsoft.com/office/drawing/2010/main" val="0"/>
+              </a:ext>
+            </a:extLst>
+          </a:blip>
+          <a:stretch>
+            <a:fillRect/>
+          </a:stretch>
+        </p:blipFill>
+        <p:spPr>
+          <a:xfrm>
+            <a:off x="962278" y="1460499"/>
+            <a:ext cx="7258276" cy="5289639"/>
+          </a:xfrm>
+          <a:prstGeom prst="rect">
+            <a:avLst/>
+          </a:prstGeom>
+        </p:spPr>
+      </p:pic>
     </p:spTree>
     <p:extLst>
       <p:ext uri="{BB962C8B-B14F-4D97-AF65-F5344CB8AC3E}">
-        <p14:creationId xmlns:p14="http://schemas.microsoft.com/office/powerpoint/2010/main" val="1161798883"/>
+        <p14:creationId xmlns:p14="http://schemas.microsoft.com/office/powerpoint/2010/main" val="3186945621"/>
       </p:ext>
     </p:extLst>
   </p:cSld>
@@ -8768,6 +8817,161 @@
           <a:p>
             <a:r>
               <a:rPr lang="en-US" dirty="0" smtClean="0"/>
+              <a:t>Summary of Basic Options</a:t>
+            </a:r>
+            <a:endParaRPr lang="en-US" dirty="0"/>
+          </a:p>
+        </p:txBody>
+      </p:sp>
+      <p:sp>
+        <p:nvSpPr>
+          <p:cNvPr id="3" name="Content Placeholder 2"/>
+          <p:cNvSpPr>
+            <a:spLocks noGrp="1"/>
+          </p:cNvSpPr>
+          <p:nvPr>
+            <p:ph idx="1"/>
+          </p:nvPr>
+        </p:nvSpPr>
+        <p:spPr/>
+        <p:txBody>
+          <a:bodyPr/>
+          <a:lstStyle/>
+          <a:p>
+            <a:r>
+              <a:rPr lang="en-US" dirty="0" smtClean="0"/>
+              <a:t>Controlling Output</a:t>
+            </a:r>
+          </a:p>
+          <a:p>
+            <a:pPr lvl="1"/>
+            <a:r>
+              <a:rPr lang="en-US" dirty="0" smtClean="0"/>
+              <a:t>results: “markup”, “</a:t>
+            </a:r>
+            <a:r>
+              <a:rPr lang="en-US" dirty="0" err="1" smtClean="0"/>
+              <a:t>asis</a:t>
+            </a:r>
+            <a:r>
+              <a:rPr lang="en-US" dirty="0" smtClean="0"/>
+              <a:t>”, “hide”</a:t>
+            </a:r>
+          </a:p>
+          <a:p>
+            <a:pPr lvl="1"/>
+            <a:r>
+              <a:rPr lang="en-US" dirty="0" smtClean="0"/>
+              <a:t>echo: TRUE, FALSE</a:t>
+            </a:r>
+          </a:p>
+          <a:p>
+            <a:pPr lvl="1"/>
+            <a:r>
+              <a:rPr lang="en-US" dirty="0" err="1" smtClean="0"/>
+              <a:t>eval</a:t>
+            </a:r>
+            <a:r>
+              <a:rPr lang="en-US" dirty="0" smtClean="0"/>
+              <a:t>: TRUE, FALSE</a:t>
+            </a:r>
+          </a:p>
+          <a:p>
+            <a:r>
+              <a:rPr lang="en-US" dirty="0" smtClean="0"/>
+              <a:t>Figures</a:t>
+            </a:r>
+          </a:p>
+          <a:p>
+            <a:pPr lvl="1"/>
+            <a:r>
+              <a:rPr lang="en-US" dirty="0" err="1" smtClean="0"/>
+              <a:t>fig.width</a:t>
+            </a:r>
+            <a:r>
+              <a:rPr lang="en-US" dirty="0" smtClean="0"/>
+              <a:t>: width of plot (passed to graphics </a:t>
+            </a:r>
+            <a:r>
+              <a:rPr lang="en-US" dirty="0" err="1" smtClean="0"/>
+              <a:t>dev</a:t>
+            </a:r>
+            <a:r>
+              <a:rPr lang="en-US" dirty="0" smtClean="0"/>
+              <a:t>)</a:t>
+            </a:r>
+          </a:p>
+          <a:p>
+            <a:pPr lvl="1"/>
+            <a:r>
+              <a:rPr lang="en-US" dirty="0" err="1" smtClean="0"/>
+              <a:t>fig.height</a:t>
+            </a:r>
+            <a:r>
+              <a:rPr lang="en-US" dirty="0" smtClean="0"/>
+              <a:t>: height of plot</a:t>
+            </a:r>
+          </a:p>
+          <a:p>
+            <a:pPr lvl="1"/>
+            <a:r>
+              <a:rPr lang="en-US" dirty="0" err="1" smtClean="0"/>
+              <a:t>fig.path</a:t>
+            </a:r>
+            <a:r>
+              <a:rPr lang="en-US" dirty="0" smtClean="0"/>
+              <a:t>: directory to put figures (“figure/”)</a:t>
+            </a:r>
+          </a:p>
+        </p:txBody>
+      </p:sp>
+    </p:spTree>
+    <p:extLst>
+      <p:ext uri="{BB962C8B-B14F-4D97-AF65-F5344CB8AC3E}">
+        <p14:creationId xmlns:p14="http://schemas.microsoft.com/office/powerpoint/2010/main" val="1161798883"/>
+      </p:ext>
+    </p:extLst>
+  </p:cSld>
+  <p:clrMapOvr>
+    <a:masterClrMapping/>
+  </p:clrMapOvr>
+</p:sld>
+</file>
+
+<file path=ppt/slides/slide51.xml><?xml version="1.0" encoding="utf-8"?>
+<p:sld xmlns:a="http://schemas.openxmlformats.org/drawingml/2006/main" xmlns:r="http://schemas.openxmlformats.org/officeDocument/2006/relationships" xmlns:p="http://schemas.openxmlformats.org/presentationml/2006/main">
+  <p:cSld>
+    <p:spTree>
+      <p:nvGrpSpPr>
+        <p:cNvPr id="1" name=""/>
+        <p:cNvGrpSpPr/>
+        <p:nvPr/>
+      </p:nvGrpSpPr>
+      <p:grpSpPr>
+        <a:xfrm>
+          <a:off x="0" y="0"/>
+          <a:ext cx="0" cy="0"/>
+          <a:chOff x="0" y="0"/>
+          <a:chExt cx="0" cy="0"/>
+        </a:xfrm>
+      </p:grpSpPr>
+      <p:sp>
+        <p:nvSpPr>
+          <p:cNvPr id="2" name="Title 1"/>
+          <p:cNvSpPr>
+            <a:spLocks noGrp="1"/>
+          </p:cNvSpPr>
+          <p:nvPr>
+            <p:ph type="title"/>
+          </p:nvPr>
+        </p:nvSpPr>
+        <p:spPr/>
+        <p:txBody>
+          <a:bodyPr/>
+          <a:lstStyle/>
+          <a:p>
+            <a:r>
+              <a:rPr lang="en-US" dirty="0" smtClean="0"/>
               <a:t>Reproducibility: The Bigger Picture</a:t>
             </a:r>
             <a:endParaRPr lang="en-US" dirty="0"/>
@@ -8858,7 +9062,7 @@
 </p:sld>
 </file>
 
-<file path=ppt/slides/slide51.xml><?xml version="1.0" encoding="utf-8"?>
+<file path=ppt/slides/slide52.xml><?xml version="1.0" encoding="utf-8"?>
 <p:sld xmlns:a="http://schemas.openxmlformats.org/drawingml/2006/main" xmlns:r="http://schemas.openxmlformats.org/officeDocument/2006/relationships" xmlns:p="http://schemas.openxmlformats.org/presentationml/2006/main">
   <p:cSld>
     <p:spTree>

</xml_diff>